<commit_message>
- Add SiTree Deign document
</commit_message>
<xml_diff>
--- a/SD_Crawler4j/docs/Crawler4j_SiTreeDesign.pptx
+++ b/SD_Crawler4j/docs/Crawler4j_SiTreeDesign.pptx
@@ -6,11 +6,13 @@
   </p:sldMasterIdLst>
   <p:sldIdLst>
     <p:sldId id="256" r:id="rId2"/>
-    <p:sldId id="257" r:id="rId3"/>
-    <p:sldId id="259" r:id="rId4"/>
-    <p:sldId id="260" r:id="rId5"/>
-    <p:sldId id="261" r:id="rId6"/>
-    <p:sldId id="258" r:id="rId7"/>
+    <p:sldId id="262" r:id="rId3"/>
+    <p:sldId id="263" r:id="rId4"/>
+    <p:sldId id="257" r:id="rId5"/>
+    <p:sldId id="259" r:id="rId6"/>
+    <p:sldId id="260" r:id="rId7"/>
+    <p:sldId id="261" r:id="rId8"/>
+    <p:sldId id="258" r:id="rId9"/>
   </p:sldIdLst>
   <p:sldSz cx="9144000" cy="6858000" type="screen4x3"/>
   <p:notesSz cx="6858000" cy="9144000"/>
@@ -293,7 +295,7 @@
           <a:p>
             <a:fld id="{5BBEAD13-0566-4C6C-97E7-55F17F24B09F}" type="datetimeFigureOut">
               <a:rPr lang="zh-TW" altLang="en-US" smtClean="0"/>
-              <a:t>2014/4/10</a:t>
+              <a:t>2014/4/22</a:t>
             </a:fld>
             <a:endParaRPr lang="zh-TW" altLang="en-US"/>
           </a:p>
@@ -458,7 +460,7 @@
           <a:p>
             <a:fld id="{5BBEAD13-0566-4C6C-97E7-55F17F24B09F}" type="datetimeFigureOut">
               <a:rPr lang="zh-TW" altLang="en-US" smtClean="0"/>
-              <a:t>2014/4/10</a:t>
+              <a:t>2014/4/22</a:t>
             </a:fld>
             <a:endParaRPr lang="zh-TW" altLang="en-US"/>
           </a:p>
@@ -633,7 +635,7 @@
           <a:p>
             <a:fld id="{5BBEAD13-0566-4C6C-97E7-55F17F24B09F}" type="datetimeFigureOut">
               <a:rPr lang="zh-TW" altLang="en-US" smtClean="0"/>
-              <a:t>2014/4/10</a:t>
+              <a:t>2014/4/22</a:t>
             </a:fld>
             <a:endParaRPr lang="zh-TW" altLang="en-US"/>
           </a:p>
@@ -798,7 +800,7 @@
           <a:p>
             <a:fld id="{5BBEAD13-0566-4C6C-97E7-55F17F24B09F}" type="datetimeFigureOut">
               <a:rPr lang="zh-TW" altLang="en-US" smtClean="0"/>
-              <a:t>2014/4/10</a:t>
+              <a:t>2014/4/22</a:t>
             </a:fld>
             <a:endParaRPr lang="zh-TW" altLang="en-US"/>
           </a:p>
@@ -1039,7 +1041,7 @@
           <a:p>
             <a:fld id="{5BBEAD13-0566-4C6C-97E7-55F17F24B09F}" type="datetimeFigureOut">
               <a:rPr lang="zh-TW" altLang="en-US" smtClean="0"/>
-              <a:t>2014/4/10</a:t>
+              <a:t>2014/4/22</a:t>
             </a:fld>
             <a:endParaRPr lang="zh-TW" altLang="en-US"/>
           </a:p>
@@ -1322,7 +1324,7 @@
           <a:p>
             <a:fld id="{5BBEAD13-0566-4C6C-97E7-55F17F24B09F}" type="datetimeFigureOut">
               <a:rPr lang="zh-TW" altLang="en-US" smtClean="0"/>
-              <a:t>2014/4/10</a:t>
+              <a:t>2014/4/22</a:t>
             </a:fld>
             <a:endParaRPr lang="zh-TW" altLang="en-US"/>
           </a:p>
@@ -1739,7 +1741,7 @@
           <a:p>
             <a:fld id="{5BBEAD13-0566-4C6C-97E7-55F17F24B09F}" type="datetimeFigureOut">
               <a:rPr lang="zh-TW" altLang="en-US" smtClean="0"/>
-              <a:t>2014/4/10</a:t>
+              <a:t>2014/4/22</a:t>
             </a:fld>
             <a:endParaRPr lang="zh-TW" altLang="en-US"/>
           </a:p>
@@ -1852,7 +1854,7 @@
           <a:p>
             <a:fld id="{5BBEAD13-0566-4C6C-97E7-55F17F24B09F}" type="datetimeFigureOut">
               <a:rPr lang="zh-TW" altLang="en-US" smtClean="0"/>
-              <a:t>2014/4/10</a:t>
+              <a:t>2014/4/22</a:t>
             </a:fld>
             <a:endParaRPr lang="zh-TW" altLang="en-US"/>
           </a:p>
@@ -1942,7 +1944,7 @@
           <a:p>
             <a:fld id="{5BBEAD13-0566-4C6C-97E7-55F17F24B09F}" type="datetimeFigureOut">
               <a:rPr lang="zh-TW" altLang="en-US" smtClean="0"/>
-              <a:t>2014/4/10</a:t>
+              <a:t>2014/4/22</a:t>
             </a:fld>
             <a:endParaRPr lang="zh-TW" altLang="en-US"/>
           </a:p>
@@ -2214,7 +2216,7 @@
           <a:p>
             <a:fld id="{5BBEAD13-0566-4C6C-97E7-55F17F24B09F}" type="datetimeFigureOut">
               <a:rPr lang="zh-TW" altLang="en-US" smtClean="0"/>
-              <a:t>2014/4/10</a:t>
+              <a:t>2014/4/22</a:t>
             </a:fld>
             <a:endParaRPr lang="zh-TW" altLang="en-US"/>
           </a:p>
@@ -2462,7 +2464,7 @@
           <a:p>
             <a:fld id="{5BBEAD13-0566-4C6C-97E7-55F17F24B09F}" type="datetimeFigureOut">
               <a:rPr lang="zh-TW" altLang="en-US" smtClean="0"/>
-              <a:t>2014/4/10</a:t>
+              <a:t>2014/4/22</a:t>
             </a:fld>
             <a:endParaRPr lang="zh-TW" altLang="en-US"/>
           </a:p>
@@ -2670,7 +2672,7 @@
           <a:p>
             <a:fld id="{5BBEAD13-0566-4C6C-97E7-55F17F24B09F}" type="datetimeFigureOut">
               <a:rPr lang="zh-TW" altLang="en-US" smtClean="0"/>
-              <a:t>2014/4/10</a:t>
+              <a:t>2014/4/22</a:t>
             </a:fld>
             <a:endParaRPr lang="zh-TW" altLang="en-US"/>
           </a:p>
@@ -3080,10 +3082,18 @@
           </a:bodyPr>
           <a:lstStyle/>
           <a:p>
-            <a:r>
-              <a:rPr lang="en-US" altLang="zh-TW" sz="2400" dirty="0"/>
-              <a:t>1. </a:t>
-            </a:r>
+            <a:pPr marL="457200" indent="-457200" algn="l">
+              <a:buAutoNum type="arabicPeriod"/>
+            </a:pPr>
+            <a:r>
+              <a:rPr lang="en-US" altLang="zh-TW" sz="2400" dirty="0" smtClean="0"/>
+              <a:t>SiTree requirement &amp; design</a:t>
+            </a:r>
+          </a:p>
+          <a:p>
+            <a:pPr marL="457200" indent="-457200" algn="l">
+              <a:buAutoNum type="arabicPeriod"/>
+            </a:pPr>
             <a:r>
               <a:rPr lang="zh-TW" altLang="en-US" sz="2400" dirty="0"/>
               <a:t>示範 </a:t>
@@ -3094,35 +3104,23 @@
             </a:r>
             <a:r>
               <a:rPr lang="zh-TW" altLang="en-US" sz="2400" dirty="0"/>
-              <a:t>類別的使用</a:t>
-            </a:r>
-            <a:br>
-              <a:rPr lang="zh-TW" altLang="en-US" sz="2400" dirty="0"/>
-            </a:br>
-            <a:r>
-              <a:rPr lang="en-US" altLang="zh-TW" sz="2400" dirty="0"/>
-              <a:t>2. </a:t>
-            </a:r>
-            <a:r>
-              <a:rPr lang="zh-TW" altLang="en-US" sz="2400" dirty="0"/>
-              <a:t>收集其他 </a:t>
-            </a:r>
-            <a:r>
-              <a:rPr lang="en-US" altLang="zh-TW" sz="2400" dirty="0"/>
-              <a:t>Module </a:t>
-            </a:r>
-            <a:r>
-              <a:rPr lang="zh-TW" altLang="en-US" sz="2400" dirty="0"/>
-              <a:t>對 </a:t>
-            </a:r>
-            <a:r>
-              <a:rPr lang="en-US" altLang="zh-TW" sz="2400" dirty="0"/>
-              <a:t>SiTree </a:t>
-            </a:r>
-            <a:r>
-              <a:rPr lang="zh-TW" altLang="en-US" sz="2400" dirty="0"/>
-              <a:t>的需求</a:t>
-            </a:r>
+              <a:t>類別的</a:t>
+            </a:r>
+            <a:r>
+              <a:rPr lang="zh-TW" altLang="en-US" sz="2400" dirty="0" smtClean="0"/>
+              <a:t>使用</a:t>
+            </a:r>
+            <a:endParaRPr lang="en-US" altLang="zh-TW" sz="2400" dirty="0"/>
+          </a:p>
+          <a:p>
+            <a:pPr marL="457200" indent="-457200" algn="l">
+              <a:buAutoNum type="arabicPeriod"/>
+            </a:pPr>
+            <a:r>
+              <a:rPr lang="en-US" altLang="zh-TW" sz="2400" dirty="0" smtClean="0"/>
+              <a:t>Crawl4j issue(s)</a:t>
+            </a:r>
+            <a:endParaRPr lang="zh-TW" altLang="en-US" sz="2400" dirty="0"/>
           </a:p>
         </p:txBody>
       </p:sp>
@@ -3175,18 +3173,838 @@
         </p:nvSpPr>
         <p:spPr/>
         <p:txBody>
-          <a:bodyPr/>
+          <a:bodyPr>
+            <a:normAutofit/>
+          </a:bodyPr>
           <a:lstStyle/>
           <a:p>
             <a:r>
-              <a:rPr lang="en-US" altLang="zh-TW" dirty="0" smtClean="0"/>
+              <a:rPr lang="en-US" altLang="zh-TW" sz="3200" dirty="0" smtClean="0"/>
               <a:t>SiTree </a:t>
             </a:r>
             <a:r>
-              <a:rPr lang="en-US" altLang="zh-TW" dirty="0" smtClean="0"/>
-              <a:t>Usage (1)</a:t>
-            </a:r>
-            <a:endParaRPr lang="zh-TW" altLang="en-US" dirty="0"/>
+              <a:rPr lang="en-US" altLang="zh-TW" sz="3200" dirty="0" smtClean="0"/>
+              <a:t>Requirement</a:t>
+            </a:r>
+            <a:endParaRPr lang="zh-TW" altLang="en-US" sz="3200" dirty="0"/>
+          </a:p>
+        </p:txBody>
+      </p:sp>
+      <p:sp>
+        <p:nvSpPr>
+          <p:cNvPr id="3" name="內容版面配置區 2"/>
+          <p:cNvSpPr>
+            <a:spLocks noGrp="1"/>
+          </p:cNvSpPr>
+          <p:nvPr>
+            <p:ph idx="1"/>
+          </p:nvPr>
+        </p:nvSpPr>
+        <p:spPr>
+          <a:xfrm>
+            <a:off x="251520" y="1340768"/>
+            <a:ext cx="7632848" cy="4785395"/>
+          </a:xfrm>
+        </p:spPr>
+        <p:txBody>
+          <a:bodyPr>
+            <a:normAutofit/>
+          </a:bodyPr>
+          <a:lstStyle/>
+          <a:p>
+            <a:r>
+              <a:rPr lang="en-US" altLang="zh-TW" sz="1800" b="1" dirty="0" smtClean="0"/>
+              <a:t>Functional Requirement:</a:t>
+            </a:r>
+          </a:p>
+          <a:p>
+            <a:pPr lvl="1"/>
+            <a:r>
+              <a:rPr lang="en-US" altLang="zh-TW" sz="1400" b="1" dirty="0" smtClean="0"/>
+              <a:t>CrawlController</a:t>
+            </a:r>
+            <a:r>
+              <a:rPr lang="en-US" altLang="zh-TW" sz="1400" dirty="0" smtClean="0"/>
+              <a:t> can </a:t>
+            </a:r>
+            <a:r>
+              <a:rPr lang="en-US" altLang="zh-TW" sz="1400" dirty="0" smtClean="0">
+                <a:solidFill>
+                  <a:srgbClr val="0070C0"/>
+                </a:solidFill>
+              </a:rPr>
+              <a:t>start</a:t>
+            </a:r>
+            <a:r>
+              <a:rPr lang="en-US" altLang="zh-TW" sz="1400" dirty="0" smtClean="0"/>
+              <a:t> to crawl pages. User can decide </a:t>
+            </a:r>
+            <a:r>
+              <a:rPr lang="en-US" altLang="zh-TW" sz="1400" i="1" dirty="0" smtClean="0">
+                <a:solidFill>
+                  <a:schemeClr val="accent6">
+                    <a:lumMod val="50000"/>
+                  </a:schemeClr>
+                </a:solidFill>
+              </a:rPr>
+              <a:t>how many threads </a:t>
+            </a:r>
+            <a:r>
+              <a:rPr lang="en-US" altLang="zh-TW" sz="1400" dirty="0" smtClean="0"/>
+              <a:t>used in the crawling process and </a:t>
+            </a:r>
+            <a:r>
+              <a:rPr lang="en-US" altLang="zh-TW" sz="1400" b="1" dirty="0" smtClean="0"/>
+              <a:t>CrawlController</a:t>
+            </a:r>
+            <a:r>
+              <a:rPr lang="en-US" altLang="zh-TW" sz="1400" dirty="0" smtClean="0"/>
+              <a:t> has default setting for it.</a:t>
+            </a:r>
+          </a:p>
+          <a:p>
+            <a:pPr lvl="1"/>
+            <a:r>
+              <a:rPr lang="en-US" altLang="zh-TW" sz="1400" dirty="0" smtClean="0"/>
+              <a:t>Application can use </a:t>
+            </a:r>
+            <a:r>
+              <a:rPr lang="en-US" altLang="zh-TW" sz="1400" b="1" dirty="0" smtClean="0"/>
+              <a:t>SiTree</a:t>
+            </a:r>
+            <a:r>
+              <a:rPr lang="en-US" altLang="zh-TW" sz="1400" dirty="0" smtClean="0"/>
+              <a:t> to </a:t>
+            </a:r>
+            <a:r>
+              <a:rPr lang="en-US" altLang="zh-TW" sz="1400" dirty="0" smtClean="0">
+                <a:solidFill>
+                  <a:srgbClr val="0070C0"/>
+                </a:solidFill>
+              </a:rPr>
+              <a:t>crawl</a:t>
+            </a:r>
+            <a:r>
+              <a:rPr lang="en-US" altLang="zh-TW" sz="1400" dirty="0" smtClean="0"/>
+              <a:t> pages through </a:t>
+            </a:r>
+            <a:r>
+              <a:rPr lang="en-US" altLang="zh-TW" sz="1400" b="1" dirty="0" smtClean="0"/>
+              <a:t>CrawlController</a:t>
+            </a:r>
+            <a:r>
+              <a:rPr lang="en-US" altLang="zh-TW" sz="1400" dirty="0"/>
+              <a:t> </a:t>
+            </a:r>
+            <a:r>
+              <a:rPr lang="en-US" altLang="zh-TW" sz="1400" dirty="0" smtClean="0"/>
+              <a:t>and </a:t>
+            </a:r>
+            <a:r>
+              <a:rPr lang="en-US" altLang="zh-TW" sz="1400" dirty="0" smtClean="0">
+                <a:solidFill>
+                  <a:srgbClr val="0070C0"/>
+                </a:solidFill>
+              </a:rPr>
+              <a:t>traverse</a:t>
+            </a:r>
+            <a:r>
+              <a:rPr lang="en-US" altLang="zh-TW" sz="1400" dirty="0" smtClean="0"/>
+              <a:t> the result in tree structure via </a:t>
+            </a:r>
+            <a:r>
+              <a:rPr lang="en-US" altLang="zh-TW" sz="1400" dirty="0" smtClean="0">
+                <a:solidFill>
+                  <a:srgbClr val="FF0000"/>
+                </a:solidFill>
+              </a:rPr>
+              <a:t>DFS/BFS algorithms</a:t>
+            </a:r>
+            <a:r>
+              <a:rPr lang="en-US" altLang="zh-TW" sz="1400" dirty="0" smtClean="0"/>
+              <a:t>.</a:t>
+            </a:r>
+          </a:p>
+          <a:p>
+            <a:pPr lvl="1"/>
+            <a:r>
+              <a:rPr lang="en-US" altLang="zh-TW" sz="1400" b="1" dirty="0" smtClean="0"/>
+              <a:t>CrawlController</a:t>
+            </a:r>
+            <a:r>
+              <a:rPr lang="en-US" altLang="zh-TW" sz="1400" dirty="0" smtClean="0"/>
+              <a:t> will </a:t>
+            </a:r>
+            <a:r>
+              <a:rPr lang="en-US" altLang="zh-TW" sz="1400" dirty="0" smtClean="0">
+                <a:solidFill>
+                  <a:srgbClr val="0070C0"/>
+                </a:solidFill>
+              </a:rPr>
+              <a:t>notify</a:t>
+            </a:r>
+            <a:r>
+              <a:rPr lang="en-US" altLang="zh-TW" sz="1400" dirty="0" smtClean="0"/>
+              <a:t> </a:t>
+            </a:r>
+            <a:r>
+              <a:rPr lang="en-US" altLang="zh-TW" sz="1400" b="1" dirty="0" smtClean="0"/>
+              <a:t>SiTree</a:t>
+            </a:r>
+            <a:r>
+              <a:rPr lang="en-US" altLang="zh-TW" sz="1400" dirty="0" smtClean="0"/>
+              <a:t> on each crawling and </a:t>
+            </a:r>
+            <a:r>
+              <a:rPr lang="en-US" altLang="zh-TW" sz="1400" b="1" dirty="0" smtClean="0"/>
+              <a:t>SiTree</a:t>
+            </a:r>
+            <a:r>
+              <a:rPr lang="en-US" altLang="zh-TW" sz="1400" dirty="0" smtClean="0"/>
+              <a:t> can know the crawling result is success or fail.</a:t>
+            </a:r>
+          </a:p>
+          <a:p>
+            <a:r>
+              <a:rPr lang="en-US" altLang="zh-TW" sz="1800" b="1" dirty="0"/>
+              <a:t>Non Functional Requirement</a:t>
+            </a:r>
+            <a:r>
+              <a:rPr lang="en-US" altLang="zh-TW" sz="1800" b="1" dirty="0" smtClean="0"/>
+              <a:t>:</a:t>
+            </a:r>
+          </a:p>
+          <a:p>
+            <a:pPr lvl="1"/>
+            <a:r>
+              <a:rPr lang="en-US" altLang="zh-TW" sz="1400" b="1" dirty="0" smtClean="0"/>
+              <a:t>CrawlController </a:t>
+            </a:r>
+            <a:r>
+              <a:rPr lang="en-US" altLang="zh-TW" sz="1400" dirty="0" smtClean="0"/>
+              <a:t>can crawl pages unsynchronized. </a:t>
+            </a:r>
+          </a:p>
+          <a:p>
+            <a:pPr lvl="1"/>
+            <a:r>
+              <a:rPr lang="en-US" altLang="zh-TW" sz="1400" b="1" dirty="0" smtClean="0"/>
+              <a:t>CrawlController </a:t>
+            </a:r>
+            <a:r>
+              <a:rPr lang="en-US" altLang="zh-TW" sz="1400" dirty="0" smtClean="0"/>
+              <a:t>can decide to drop specific file type during crawling.</a:t>
+            </a:r>
+          </a:p>
+          <a:p>
+            <a:pPr lvl="1"/>
+            <a:r>
+              <a:rPr lang="en-US" altLang="zh-TW" sz="1400" dirty="0" smtClean="0"/>
+              <a:t>Others</a:t>
+            </a:r>
+            <a:endParaRPr lang="en-US" altLang="zh-TW" sz="1400" dirty="0"/>
+          </a:p>
+          <a:p>
+            <a:endParaRPr lang="zh-TW" altLang="en-US" sz="1800" dirty="0"/>
+          </a:p>
+        </p:txBody>
+      </p:sp>
+    </p:spTree>
+    <p:extLst>
+      <p:ext uri="{BB962C8B-B14F-4D97-AF65-F5344CB8AC3E}">
+        <p14:creationId xmlns:p14="http://schemas.microsoft.com/office/powerpoint/2010/main" val="2462126401"/>
+      </p:ext>
+    </p:extLst>
+  </p:cSld>
+  <p:clrMapOvr>
+    <a:masterClrMapping/>
+  </p:clrMapOvr>
+  <p:timing>
+    <p:tnLst>
+      <p:par>
+        <p:cTn id="1" dur="indefinite" restart="never" nodeType="tmRoot"/>
+      </p:par>
+    </p:tnLst>
+  </p:timing>
+</p:sld>
+</file>
+
+<file path=ppt/slides/slide3.xml><?xml version="1.0" encoding="utf-8"?>
+<p:sld xmlns:a="http://schemas.openxmlformats.org/drawingml/2006/main" xmlns:r="http://schemas.openxmlformats.org/officeDocument/2006/relationships" xmlns:p="http://schemas.openxmlformats.org/presentationml/2006/main">
+  <p:cSld>
+    <p:spTree>
+      <p:nvGrpSpPr>
+        <p:cNvPr id="1" name=""/>
+        <p:cNvGrpSpPr/>
+        <p:nvPr/>
+      </p:nvGrpSpPr>
+      <p:grpSpPr>
+        <a:xfrm>
+          <a:off x="0" y="0"/>
+          <a:ext cx="0" cy="0"/>
+          <a:chOff x="0" y="0"/>
+          <a:chExt cx="0" cy="0"/>
+        </a:xfrm>
+      </p:grpSpPr>
+      <p:sp>
+        <p:nvSpPr>
+          <p:cNvPr id="2" name="標題 1"/>
+          <p:cNvSpPr>
+            <a:spLocks noGrp="1"/>
+          </p:cNvSpPr>
+          <p:nvPr>
+            <p:ph type="title"/>
+          </p:nvPr>
+        </p:nvSpPr>
+        <p:spPr/>
+        <p:txBody>
+          <a:bodyPr>
+            <a:normAutofit/>
+          </a:bodyPr>
+          <a:lstStyle/>
+          <a:p>
+            <a:r>
+              <a:rPr lang="en-US" altLang="zh-TW" sz="3200" dirty="0" smtClean="0"/>
+              <a:t>SiTree </a:t>
+            </a:r>
+            <a:r>
+              <a:rPr lang="en-US" altLang="zh-TW" sz="3200" dirty="0" smtClean="0"/>
+              <a:t>Initial Design</a:t>
+            </a:r>
+            <a:endParaRPr lang="zh-TW" altLang="en-US" sz="3200" dirty="0"/>
+          </a:p>
+        </p:txBody>
+      </p:sp>
+      <p:pic>
+        <p:nvPicPr>
+          <p:cNvPr id="4" name="圖片 3"/>
+          <p:cNvPicPr>
+            <a:picLocks noChangeAspect="1"/>
+          </p:cNvPicPr>
+          <p:nvPr/>
+        </p:nvPicPr>
+        <p:blipFill>
+          <a:blip r:embed="rId3">
+            <a:extLst>
+              <a:ext uri="{28A0092B-C50C-407E-A947-70E740481C1C}">
+                <a14:useLocalDpi xmlns:a14="http://schemas.microsoft.com/office/drawing/2010/main" val="0"/>
+              </a:ext>
+            </a:extLst>
+          </a:blip>
+          <a:stretch>
+            <a:fillRect/>
+          </a:stretch>
+        </p:blipFill>
+        <p:spPr>
+          <a:xfrm>
+            <a:off x="202312" y="1340768"/>
+            <a:ext cx="8809524" cy="4895238"/>
+          </a:xfrm>
+          <a:prstGeom prst="rect">
+            <a:avLst/>
+          </a:prstGeom>
+        </p:spPr>
+      </p:pic>
+      <p:grpSp>
+        <p:nvGrpSpPr>
+          <p:cNvPr id="11" name="群組 10"/>
+          <p:cNvGrpSpPr/>
+          <p:nvPr/>
+        </p:nvGrpSpPr>
+        <p:grpSpPr>
+          <a:xfrm>
+            <a:off x="3131840" y="3933056"/>
+            <a:ext cx="5961569" cy="2869766"/>
+            <a:chOff x="3131840" y="3933056"/>
+            <a:chExt cx="5961569" cy="2869766"/>
+          </a:xfrm>
+        </p:grpSpPr>
+        <p:pic>
+          <p:nvPicPr>
+            <p:cNvPr id="6" name="圖片 5"/>
+            <p:cNvPicPr>
+              <a:picLocks noChangeAspect="1"/>
+            </p:cNvPicPr>
+            <p:nvPr/>
+          </p:nvPicPr>
+          <p:blipFill>
+            <a:blip r:embed="rId4">
+              <a:extLst>
+                <a:ext uri="{28A0092B-C50C-407E-A947-70E740481C1C}">
+                  <a14:useLocalDpi xmlns:a14="http://schemas.microsoft.com/office/drawing/2010/main" val="0"/>
+                </a:ext>
+              </a:extLst>
+            </a:blip>
+            <a:stretch>
+              <a:fillRect/>
+            </a:stretch>
+          </p:blipFill>
+          <p:spPr>
+            <a:xfrm>
+              <a:off x="3244242" y="5669189"/>
+              <a:ext cx="5849167" cy="1133633"/>
+            </a:xfrm>
+            <a:prstGeom prst="rect">
+              <a:avLst/>
+            </a:prstGeom>
+            <a:effectLst>
+              <a:glow rad="228600">
+                <a:schemeClr val="accent6">
+                  <a:satMod val="175000"/>
+                  <a:alpha val="40000"/>
+                </a:schemeClr>
+              </a:glow>
+            </a:effectLst>
+          </p:spPr>
+        </p:pic>
+        <p:cxnSp>
+          <p:nvCxnSpPr>
+            <p:cNvPr id="8" name="直線單箭頭接點 7"/>
+            <p:cNvCxnSpPr/>
+            <p:nvPr/>
+          </p:nvCxnSpPr>
+          <p:spPr>
+            <a:xfrm flipV="1">
+              <a:off x="5220072" y="3933056"/>
+              <a:ext cx="144016" cy="1080120"/>
+            </a:xfrm>
+            <a:prstGeom prst="straightConnector1">
+              <a:avLst/>
+            </a:prstGeom>
+            <a:ln w="38100">
+              <a:prstDash val="sysDash"/>
+              <a:tailEnd type="arrow"/>
+            </a:ln>
+          </p:spPr>
+          <p:style>
+            <a:lnRef idx="1">
+              <a:schemeClr val="accent1"/>
+            </a:lnRef>
+            <a:fillRef idx="0">
+              <a:schemeClr val="accent1"/>
+            </a:fillRef>
+            <a:effectRef idx="0">
+              <a:schemeClr val="accent1"/>
+            </a:effectRef>
+            <a:fontRef idx="minor">
+              <a:schemeClr val="tx1"/>
+            </a:fontRef>
+          </p:style>
+        </p:cxnSp>
+        <p:cxnSp>
+          <p:nvCxnSpPr>
+            <p:cNvPr id="10" name="直線單箭頭接點 9"/>
+            <p:cNvCxnSpPr/>
+            <p:nvPr/>
+          </p:nvCxnSpPr>
+          <p:spPr>
+            <a:xfrm flipH="1">
+              <a:off x="3131840" y="5229200"/>
+              <a:ext cx="1800200" cy="0"/>
+            </a:xfrm>
+            <a:prstGeom prst="straightConnector1">
+              <a:avLst/>
+            </a:prstGeom>
+            <a:ln w="38100">
+              <a:prstDash val="sysDash"/>
+              <a:tailEnd type="arrow"/>
+            </a:ln>
+          </p:spPr>
+          <p:style>
+            <a:lnRef idx="1">
+              <a:schemeClr val="accent1"/>
+            </a:lnRef>
+            <a:fillRef idx="0">
+              <a:schemeClr val="accent1"/>
+            </a:fillRef>
+            <a:effectRef idx="0">
+              <a:schemeClr val="accent1"/>
+            </a:effectRef>
+            <a:fontRef idx="minor">
+              <a:schemeClr val="tx1"/>
+            </a:fontRef>
+          </p:style>
+        </p:cxnSp>
+      </p:grpSp>
+      <p:grpSp>
+        <p:nvGrpSpPr>
+          <p:cNvPr id="14" name="群組 13"/>
+          <p:cNvGrpSpPr/>
+          <p:nvPr/>
+        </p:nvGrpSpPr>
+        <p:grpSpPr>
+          <a:xfrm>
+            <a:off x="710238" y="1916832"/>
+            <a:ext cx="6238026" cy="3669042"/>
+            <a:chOff x="710238" y="1916832"/>
+            <a:chExt cx="6238026" cy="3669042"/>
+          </a:xfrm>
+        </p:grpSpPr>
+        <p:sp>
+          <p:nvSpPr>
+            <p:cNvPr id="12" name="矩形 11"/>
+            <p:cNvSpPr/>
+            <p:nvPr/>
+          </p:nvSpPr>
+          <p:spPr>
+            <a:xfrm>
+              <a:off x="3923928" y="1916832"/>
+              <a:ext cx="3024336" cy="216024"/>
+            </a:xfrm>
+            <a:prstGeom prst="rect">
+              <a:avLst/>
+            </a:prstGeom>
+            <a:noFill/>
+            <a:ln>
+              <a:solidFill>
+                <a:srgbClr val="0070C0"/>
+              </a:solidFill>
+            </a:ln>
+          </p:spPr>
+          <p:style>
+            <a:lnRef idx="2">
+              <a:schemeClr val="accent1">
+                <a:shade val="50000"/>
+              </a:schemeClr>
+            </a:lnRef>
+            <a:fillRef idx="1">
+              <a:schemeClr val="accent1"/>
+            </a:fillRef>
+            <a:effectRef idx="0">
+              <a:schemeClr val="accent1"/>
+            </a:effectRef>
+            <a:fontRef idx="minor">
+              <a:schemeClr val="lt1"/>
+            </a:fontRef>
+          </p:style>
+          <p:txBody>
+            <a:bodyPr rtlCol="0" anchor="ctr"/>
+            <a:lstStyle/>
+            <a:p>
+              <a:pPr algn="ctr"/>
+              <a:endParaRPr lang="zh-TW" altLang="en-US"/>
+            </a:p>
+          </p:txBody>
+        </p:sp>
+        <p:pic>
+          <p:nvPicPr>
+            <p:cNvPr id="13" name="圖片 12"/>
+            <p:cNvPicPr>
+              <a:picLocks noChangeAspect="1"/>
+            </p:cNvPicPr>
+            <p:nvPr/>
+          </p:nvPicPr>
+          <p:blipFill>
+            <a:blip r:embed="rId5">
+              <a:extLst>
+                <a:ext uri="{28A0092B-C50C-407E-A947-70E740481C1C}">
+                  <a14:useLocalDpi xmlns:a14="http://schemas.microsoft.com/office/drawing/2010/main" val="0"/>
+                </a:ext>
+              </a:extLst>
+            </a:blip>
+            <a:stretch>
+              <a:fillRect/>
+            </a:stretch>
+          </p:blipFill>
+          <p:spPr>
+            <a:xfrm>
+              <a:off x="710238" y="2280237"/>
+              <a:ext cx="5068008" cy="3305637"/>
+            </a:xfrm>
+            <a:prstGeom prst="rect">
+              <a:avLst/>
+            </a:prstGeom>
+            <a:effectLst>
+              <a:glow rad="228600">
+                <a:schemeClr val="accent5">
+                  <a:satMod val="175000"/>
+                  <a:alpha val="40000"/>
+                </a:schemeClr>
+              </a:glow>
+            </a:effectLst>
+          </p:spPr>
+        </p:pic>
+      </p:grpSp>
+      <p:graphicFrame>
+        <p:nvGraphicFramePr>
+          <p:cNvPr id="15" name="物件 14"/>
+          <p:cNvGraphicFramePr>
+            <a:graphicFrameLocks noChangeAspect="1"/>
+          </p:cNvGraphicFramePr>
+          <p:nvPr>
+            <p:extLst>
+              <p:ext uri="{D42A27DB-BD31-4B8C-83A1-F6EECF244321}">
+                <p14:modId xmlns:p14="http://schemas.microsoft.com/office/powerpoint/2010/main" val="1372282225"/>
+              </p:ext>
+            </p:extLst>
+          </p:nvPr>
+        </p:nvGraphicFramePr>
+        <p:xfrm>
+          <a:off x="7236296" y="764704"/>
+          <a:ext cx="1676400" cy="698500"/>
+        </p:xfrm>
+        <a:graphic>
+          <a:graphicData uri="http://schemas.openxmlformats.org/presentationml/2006/ole">
+            <mc:AlternateContent xmlns:mc="http://schemas.openxmlformats.org/markup-compatibility/2006">
+              <mc:Choice xmlns:v="urn:schemas-microsoft-com:vml" Requires="v">
+                <p:oleObj spid="_x0000_s1026" name="封裝程式殼層物件" showAsIcon="1" r:id="rId6" imgW="1676880" imgH="698760" progId="Package">
+                  <p:embed/>
+                </p:oleObj>
+              </mc:Choice>
+              <mc:Fallback>
+                <p:oleObj name="封裝程式殼層物件" showAsIcon="1" r:id="rId6" imgW="1676880" imgH="698760" progId="Package">
+                  <p:embed/>
+                  <p:pic>
+                    <p:nvPicPr>
+                      <p:cNvPr id="0" name=""/>
+                      <p:cNvPicPr/>
+                      <p:nvPr/>
+                    </p:nvPicPr>
+                    <p:blipFill>
+                      <a:blip r:embed="rId7"/>
+                      <a:stretch>
+                        <a:fillRect/>
+                      </a:stretch>
+                    </p:blipFill>
+                    <p:spPr>
+                      <a:xfrm>
+                        <a:off x="7236296" y="764704"/>
+                        <a:ext cx="1676400" cy="698500"/>
+                      </a:xfrm>
+                      <a:prstGeom prst="rect">
+                        <a:avLst/>
+                      </a:prstGeom>
+                    </p:spPr>
+                  </p:pic>
+                </p:oleObj>
+              </mc:Fallback>
+            </mc:AlternateContent>
+          </a:graphicData>
+        </a:graphic>
+      </p:graphicFrame>
+    </p:spTree>
+    <p:extLst>
+      <p:ext uri="{BB962C8B-B14F-4D97-AF65-F5344CB8AC3E}">
+        <p14:creationId xmlns:p14="http://schemas.microsoft.com/office/powerpoint/2010/main" val="189105398"/>
+      </p:ext>
+    </p:extLst>
+  </p:cSld>
+  <p:clrMapOvr>
+    <a:masterClrMapping/>
+  </p:clrMapOvr>
+  <p:timing>
+    <p:tnLst>
+      <p:par>
+        <p:cTn id="1" dur="indefinite" restart="never" nodeType="tmRoot">
+          <p:childTnLst>
+            <p:seq concurrent="1" nextAc="seek">
+              <p:cTn id="2" dur="indefinite" nodeType="mainSeq">
+                <p:childTnLst>
+                  <p:par>
+                    <p:cTn id="3" fill="hold">
+                      <p:stCondLst>
+                        <p:cond delay="indefinite"/>
+                      </p:stCondLst>
+                      <p:childTnLst>
+                        <p:par>
+                          <p:cTn id="4" fill="hold">
+                            <p:stCondLst>
+                              <p:cond delay="0"/>
+                            </p:stCondLst>
+                            <p:childTnLst>
+                              <p:par>
+                                <p:cTn id="5" presetID="10" presetClass="entr" presetSubtype="0" fill="hold" nodeType="clickEffect">
+                                  <p:stCondLst>
+                                    <p:cond delay="0"/>
+                                  </p:stCondLst>
+                                  <p:childTnLst>
+                                    <p:set>
+                                      <p:cBhvr>
+                                        <p:cTn id="6" dur="1" fill="hold">
+                                          <p:stCondLst>
+                                            <p:cond delay="0"/>
+                                          </p:stCondLst>
+                                        </p:cTn>
+                                        <p:tgtEl>
+                                          <p:spTgt spid="11"/>
+                                        </p:tgtEl>
+                                        <p:attrNameLst>
+                                          <p:attrName>style.visibility</p:attrName>
+                                        </p:attrNameLst>
+                                      </p:cBhvr>
+                                      <p:to>
+                                        <p:strVal val="visible"/>
+                                      </p:to>
+                                    </p:set>
+                                    <p:animEffect transition="in" filter="fade">
+                                      <p:cBhvr>
+                                        <p:cTn id="7" dur="500"/>
+                                        <p:tgtEl>
+                                          <p:spTgt spid="11"/>
+                                        </p:tgtEl>
+                                      </p:cBhvr>
+                                    </p:animEffect>
+                                  </p:childTnLst>
+                                </p:cTn>
+                              </p:par>
+                            </p:childTnLst>
+                          </p:cTn>
+                        </p:par>
+                      </p:childTnLst>
+                    </p:cTn>
+                  </p:par>
+                  <p:par>
+                    <p:cTn id="8" fill="hold">
+                      <p:stCondLst>
+                        <p:cond delay="indefinite"/>
+                      </p:stCondLst>
+                      <p:childTnLst>
+                        <p:par>
+                          <p:cTn id="9" fill="hold">
+                            <p:stCondLst>
+                              <p:cond delay="0"/>
+                            </p:stCondLst>
+                            <p:childTnLst>
+                              <p:par>
+                                <p:cTn id="10" presetID="10" presetClass="exit" presetSubtype="0" fill="hold" nodeType="clickEffect">
+                                  <p:stCondLst>
+                                    <p:cond delay="0"/>
+                                  </p:stCondLst>
+                                  <p:childTnLst>
+                                    <p:animEffect transition="out" filter="fade">
+                                      <p:cBhvr>
+                                        <p:cTn id="11" dur="500"/>
+                                        <p:tgtEl>
+                                          <p:spTgt spid="11"/>
+                                        </p:tgtEl>
+                                      </p:cBhvr>
+                                    </p:animEffect>
+                                    <p:set>
+                                      <p:cBhvr>
+                                        <p:cTn id="12" dur="1" fill="hold">
+                                          <p:stCondLst>
+                                            <p:cond delay="499"/>
+                                          </p:stCondLst>
+                                        </p:cTn>
+                                        <p:tgtEl>
+                                          <p:spTgt spid="11"/>
+                                        </p:tgtEl>
+                                        <p:attrNameLst>
+                                          <p:attrName>style.visibility</p:attrName>
+                                        </p:attrNameLst>
+                                      </p:cBhvr>
+                                      <p:to>
+                                        <p:strVal val="hidden"/>
+                                      </p:to>
+                                    </p:set>
+                                  </p:childTnLst>
+                                </p:cTn>
+                              </p:par>
+                              <p:par>
+                                <p:cTn id="13" presetID="10" presetClass="entr" presetSubtype="0" fill="hold" nodeType="withEffect">
+                                  <p:stCondLst>
+                                    <p:cond delay="0"/>
+                                  </p:stCondLst>
+                                  <p:childTnLst>
+                                    <p:set>
+                                      <p:cBhvr>
+                                        <p:cTn id="14" dur="1" fill="hold">
+                                          <p:stCondLst>
+                                            <p:cond delay="0"/>
+                                          </p:stCondLst>
+                                        </p:cTn>
+                                        <p:tgtEl>
+                                          <p:spTgt spid="14"/>
+                                        </p:tgtEl>
+                                        <p:attrNameLst>
+                                          <p:attrName>style.visibility</p:attrName>
+                                        </p:attrNameLst>
+                                      </p:cBhvr>
+                                      <p:to>
+                                        <p:strVal val="visible"/>
+                                      </p:to>
+                                    </p:set>
+                                    <p:animEffect transition="in" filter="fade">
+                                      <p:cBhvr>
+                                        <p:cTn id="15" dur="500"/>
+                                        <p:tgtEl>
+                                          <p:spTgt spid="14"/>
+                                        </p:tgtEl>
+                                      </p:cBhvr>
+                                    </p:animEffect>
+                                  </p:childTnLst>
+                                </p:cTn>
+                              </p:par>
+                            </p:childTnLst>
+                          </p:cTn>
+                        </p:par>
+                      </p:childTnLst>
+                    </p:cTn>
+                  </p:par>
+                </p:childTnLst>
+              </p:cTn>
+              <p:prevCondLst>
+                <p:cond evt="onPrev" delay="0">
+                  <p:tgtEl>
+                    <p:sldTgt/>
+                  </p:tgtEl>
+                </p:cond>
+              </p:prevCondLst>
+              <p:nextCondLst>
+                <p:cond evt="onNext" delay="0">
+                  <p:tgtEl>
+                    <p:sldTgt/>
+                  </p:tgtEl>
+                </p:cond>
+              </p:nextCondLst>
+            </p:seq>
+          </p:childTnLst>
+        </p:cTn>
+      </p:par>
+    </p:tnLst>
+  </p:timing>
+</p:sld>
+</file>
+
+<file path=ppt/slides/slide4.xml><?xml version="1.0" encoding="utf-8"?>
+<p:sld xmlns:a="http://schemas.openxmlformats.org/drawingml/2006/main" xmlns:r="http://schemas.openxmlformats.org/officeDocument/2006/relationships" xmlns:p="http://schemas.openxmlformats.org/presentationml/2006/main">
+  <p:cSld>
+    <p:spTree>
+      <p:nvGrpSpPr>
+        <p:cNvPr id="1" name=""/>
+        <p:cNvGrpSpPr/>
+        <p:nvPr/>
+      </p:nvGrpSpPr>
+      <p:grpSpPr>
+        <a:xfrm>
+          <a:off x="0" y="0"/>
+          <a:ext cx="0" cy="0"/>
+          <a:chOff x="0" y="0"/>
+          <a:chExt cx="0" cy="0"/>
+        </a:xfrm>
+      </p:grpSpPr>
+      <p:sp>
+        <p:nvSpPr>
+          <p:cNvPr id="2" name="標題 1"/>
+          <p:cNvSpPr>
+            <a:spLocks noGrp="1"/>
+          </p:cNvSpPr>
+          <p:nvPr>
+            <p:ph type="title"/>
+          </p:nvPr>
+        </p:nvSpPr>
+        <p:spPr/>
+        <p:txBody>
+          <a:bodyPr>
+            <a:normAutofit/>
+          </a:bodyPr>
+          <a:lstStyle/>
+          <a:p>
+            <a:r>
+              <a:rPr lang="en-US" altLang="zh-TW" sz="3200" dirty="0" smtClean="0"/>
+              <a:t>SiTree Usage (1)</a:t>
+            </a:r>
+            <a:endParaRPr lang="zh-TW" altLang="en-US" sz="3200" dirty="0"/>
           </a:p>
         </p:txBody>
       </p:sp>
@@ -3661,7 +4479,7 @@
 </p:sld>
 </file>
 
-<file path=ppt/slides/slide3.xml><?xml version="1.0" encoding="utf-8"?>
+<file path=ppt/slides/slide5.xml><?xml version="1.0" encoding="utf-8"?>
 <p:sld xmlns:a="http://schemas.openxmlformats.org/drawingml/2006/main" xmlns:r="http://schemas.openxmlformats.org/officeDocument/2006/relationships" xmlns:p="http://schemas.openxmlformats.org/presentationml/2006/main">
   <p:cSld>
     <p:spTree>
@@ -3690,18 +4508,16 @@
         </p:nvSpPr>
         <p:spPr/>
         <p:txBody>
-          <a:bodyPr/>
+          <a:bodyPr>
+            <a:normAutofit/>
+          </a:bodyPr>
           <a:lstStyle/>
           <a:p>
             <a:r>
-              <a:rPr lang="en-US" altLang="zh-TW" dirty="0" smtClean="0"/>
-              <a:t>SiTree Usage </a:t>
-            </a:r>
-            <a:r>
-              <a:rPr lang="en-US" altLang="zh-TW" dirty="0" smtClean="0"/>
-              <a:t>(2)</a:t>
-            </a:r>
-            <a:endParaRPr lang="zh-TW" altLang="en-US" dirty="0"/>
+              <a:rPr lang="en-US" altLang="zh-TW" sz="3200" dirty="0" smtClean="0"/>
+              <a:t>SiTree Usage (2)</a:t>
+            </a:r>
+            <a:endParaRPr lang="zh-TW" altLang="en-US" sz="3200" dirty="0"/>
           </a:p>
         </p:txBody>
       </p:sp>
@@ -4025,7 +4841,7 @@
 </p:sld>
 </file>
 
-<file path=ppt/slides/slide4.xml><?xml version="1.0" encoding="utf-8"?>
+<file path=ppt/slides/slide6.xml><?xml version="1.0" encoding="utf-8"?>
 <p:sld xmlns:a="http://schemas.openxmlformats.org/drawingml/2006/main" xmlns:r="http://schemas.openxmlformats.org/officeDocument/2006/relationships" xmlns:p="http://schemas.openxmlformats.org/presentationml/2006/main">
   <p:cSld>
     <p:spTree>
@@ -4054,18 +4870,16 @@
         </p:nvSpPr>
         <p:spPr/>
         <p:txBody>
-          <a:bodyPr/>
+          <a:bodyPr>
+            <a:normAutofit/>
+          </a:bodyPr>
           <a:lstStyle/>
           <a:p>
             <a:r>
-              <a:rPr lang="en-US" altLang="zh-TW" dirty="0" smtClean="0"/>
-              <a:t>SiTree Usage </a:t>
-            </a:r>
-            <a:r>
-              <a:rPr lang="en-US" altLang="zh-TW" dirty="0" smtClean="0"/>
-              <a:t>(3)</a:t>
-            </a:r>
-            <a:endParaRPr lang="zh-TW" altLang="en-US" dirty="0"/>
+              <a:rPr lang="en-US" altLang="zh-TW" sz="3200" dirty="0" smtClean="0"/>
+              <a:t>SiTree Usage (3)</a:t>
+            </a:r>
+            <a:endParaRPr lang="zh-TW" altLang="en-US" sz="3200" dirty="0"/>
           </a:p>
         </p:txBody>
       </p:sp>
@@ -4105,11 +4919,7 @@
             </a:r>
             <a:r>
               <a:rPr lang="en-US" altLang="zh-TW" sz="1800" dirty="0" smtClean="0"/>
-              <a:t> </a:t>
-            </a:r>
-            <a:r>
-              <a:rPr lang="en-US" altLang="zh-TW" sz="1800" dirty="0" smtClean="0"/>
-              <a:t>:</a:t>
+              <a:t> :</a:t>
             </a:r>
           </a:p>
           <a:p>
@@ -4353,7 +5163,7 @@
 </p:sld>
 </file>
 
-<file path=ppt/slides/slide5.xml><?xml version="1.0" encoding="utf-8"?>
+<file path=ppt/slides/slide7.xml><?xml version="1.0" encoding="utf-8"?>
 <p:sld xmlns:a="http://schemas.openxmlformats.org/drawingml/2006/main" xmlns:r="http://schemas.openxmlformats.org/officeDocument/2006/relationships" xmlns:p="http://schemas.openxmlformats.org/presentationml/2006/main">
   <p:cSld>
     <p:spTree>
@@ -4382,18 +5192,16 @@
         </p:nvSpPr>
         <p:spPr/>
         <p:txBody>
-          <a:bodyPr/>
+          <a:bodyPr>
+            <a:normAutofit/>
+          </a:bodyPr>
           <a:lstStyle/>
           <a:p>
             <a:r>
-              <a:rPr lang="en-US" altLang="zh-TW" dirty="0" smtClean="0"/>
-              <a:t>SiTree Usage </a:t>
-            </a:r>
-            <a:r>
-              <a:rPr lang="en-US" altLang="zh-TW" dirty="0" smtClean="0"/>
-              <a:t>(4)</a:t>
-            </a:r>
-            <a:endParaRPr lang="zh-TW" altLang="en-US" dirty="0"/>
+              <a:rPr lang="en-US" altLang="zh-TW" sz="3200" dirty="0" smtClean="0"/>
+              <a:t>SiTree Usage (4)</a:t>
+            </a:r>
+            <a:endParaRPr lang="zh-TW" altLang="en-US" sz="3200" dirty="0"/>
           </a:p>
         </p:txBody>
       </p:sp>
@@ -4729,7 +5537,7 @@
 </p:sld>
 </file>
 
-<file path=ppt/slides/slide6.xml><?xml version="1.0" encoding="utf-8"?>
+<file path=ppt/slides/slide8.xml><?xml version="1.0" encoding="utf-8"?>
 <p:sld xmlns:a="http://schemas.openxmlformats.org/drawingml/2006/main" xmlns:r="http://schemas.openxmlformats.org/officeDocument/2006/relationships" xmlns:p="http://schemas.openxmlformats.org/presentationml/2006/main">
   <p:cSld>
     <p:spTree>
@@ -4758,14 +5566,16 @@
         </p:nvSpPr>
         <p:spPr/>
         <p:txBody>
-          <a:bodyPr/>
+          <a:bodyPr>
+            <a:normAutofit/>
+          </a:bodyPr>
           <a:lstStyle/>
           <a:p>
             <a:r>
-              <a:rPr lang="en-US" altLang="zh-TW" dirty="0" smtClean="0"/>
+              <a:rPr lang="en-US" altLang="zh-TW" sz="3200" dirty="0" smtClean="0"/>
               <a:t>Issue &amp; Enhancement</a:t>
             </a:r>
-            <a:endParaRPr lang="zh-TW" altLang="en-US" dirty="0"/>
+            <a:endParaRPr lang="zh-TW" altLang="en-US" sz="3200" dirty="0"/>
           </a:p>
         </p:txBody>
       </p:sp>

</xml_diff>

<commit_message>
- Update Design document
</commit_message>
<xml_diff>
--- a/SD_Crawler4j/docs/Crawler4j_SiTreeDesign.pptx
+++ b/SD_Crawler4j/docs/Crawler4j_SiTreeDesign.pptx
@@ -295,7 +295,7 @@
           <a:p>
             <a:fld id="{5BBEAD13-0566-4C6C-97E7-55F17F24B09F}" type="datetimeFigureOut">
               <a:rPr lang="zh-TW" altLang="en-US" smtClean="0"/>
-              <a:t>2014/4/22</a:t>
+              <a:t>2014/5/19</a:t>
             </a:fld>
             <a:endParaRPr lang="zh-TW" altLang="en-US"/>
           </a:p>
@@ -460,7 +460,7 @@
           <a:p>
             <a:fld id="{5BBEAD13-0566-4C6C-97E7-55F17F24B09F}" type="datetimeFigureOut">
               <a:rPr lang="zh-TW" altLang="en-US" smtClean="0"/>
-              <a:t>2014/4/22</a:t>
+              <a:t>2014/5/19</a:t>
             </a:fld>
             <a:endParaRPr lang="zh-TW" altLang="en-US"/>
           </a:p>
@@ -635,7 +635,7 @@
           <a:p>
             <a:fld id="{5BBEAD13-0566-4C6C-97E7-55F17F24B09F}" type="datetimeFigureOut">
               <a:rPr lang="zh-TW" altLang="en-US" smtClean="0"/>
-              <a:t>2014/4/22</a:t>
+              <a:t>2014/5/19</a:t>
             </a:fld>
             <a:endParaRPr lang="zh-TW" altLang="en-US"/>
           </a:p>
@@ -800,7 +800,7 @@
           <a:p>
             <a:fld id="{5BBEAD13-0566-4C6C-97E7-55F17F24B09F}" type="datetimeFigureOut">
               <a:rPr lang="zh-TW" altLang="en-US" smtClean="0"/>
-              <a:t>2014/4/22</a:t>
+              <a:t>2014/5/19</a:t>
             </a:fld>
             <a:endParaRPr lang="zh-TW" altLang="en-US"/>
           </a:p>
@@ -1041,7 +1041,7 @@
           <a:p>
             <a:fld id="{5BBEAD13-0566-4C6C-97E7-55F17F24B09F}" type="datetimeFigureOut">
               <a:rPr lang="zh-TW" altLang="en-US" smtClean="0"/>
-              <a:t>2014/4/22</a:t>
+              <a:t>2014/5/19</a:t>
             </a:fld>
             <a:endParaRPr lang="zh-TW" altLang="en-US"/>
           </a:p>
@@ -1324,7 +1324,7 @@
           <a:p>
             <a:fld id="{5BBEAD13-0566-4C6C-97E7-55F17F24B09F}" type="datetimeFigureOut">
               <a:rPr lang="zh-TW" altLang="en-US" smtClean="0"/>
-              <a:t>2014/4/22</a:t>
+              <a:t>2014/5/19</a:t>
             </a:fld>
             <a:endParaRPr lang="zh-TW" altLang="en-US"/>
           </a:p>
@@ -1741,7 +1741,7 @@
           <a:p>
             <a:fld id="{5BBEAD13-0566-4C6C-97E7-55F17F24B09F}" type="datetimeFigureOut">
               <a:rPr lang="zh-TW" altLang="en-US" smtClean="0"/>
-              <a:t>2014/4/22</a:t>
+              <a:t>2014/5/19</a:t>
             </a:fld>
             <a:endParaRPr lang="zh-TW" altLang="en-US"/>
           </a:p>
@@ -1854,7 +1854,7 @@
           <a:p>
             <a:fld id="{5BBEAD13-0566-4C6C-97E7-55F17F24B09F}" type="datetimeFigureOut">
               <a:rPr lang="zh-TW" altLang="en-US" smtClean="0"/>
-              <a:t>2014/4/22</a:t>
+              <a:t>2014/5/19</a:t>
             </a:fld>
             <a:endParaRPr lang="zh-TW" altLang="en-US"/>
           </a:p>
@@ -1944,7 +1944,7 @@
           <a:p>
             <a:fld id="{5BBEAD13-0566-4C6C-97E7-55F17F24B09F}" type="datetimeFigureOut">
               <a:rPr lang="zh-TW" altLang="en-US" smtClean="0"/>
-              <a:t>2014/4/22</a:t>
+              <a:t>2014/5/19</a:t>
             </a:fld>
             <a:endParaRPr lang="zh-TW" altLang="en-US"/>
           </a:p>
@@ -2216,7 +2216,7 @@
           <a:p>
             <a:fld id="{5BBEAD13-0566-4C6C-97E7-55F17F24B09F}" type="datetimeFigureOut">
               <a:rPr lang="zh-TW" altLang="en-US" smtClean="0"/>
-              <a:t>2014/4/22</a:t>
+              <a:t>2014/5/19</a:t>
             </a:fld>
             <a:endParaRPr lang="zh-TW" altLang="en-US"/>
           </a:p>
@@ -2464,7 +2464,7 @@
           <a:p>
             <a:fld id="{5BBEAD13-0566-4C6C-97E7-55F17F24B09F}" type="datetimeFigureOut">
               <a:rPr lang="zh-TW" altLang="en-US" smtClean="0"/>
-              <a:t>2014/4/22</a:t>
+              <a:t>2014/5/19</a:t>
             </a:fld>
             <a:endParaRPr lang="zh-TW" altLang="en-US"/>
           </a:p>
@@ -2672,7 +2672,7 @@
           <a:p>
             <a:fld id="{5BBEAD13-0566-4C6C-97E7-55F17F24B09F}" type="datetimeFigureOut">
               <a:rPr lang="zh-TW" altLang="en-US" smtClean="0"/>
-              <a:t>2014/4/22</a:t>
+              <a:t>2014/5/19</a:t>
             </a:fld>
             <a:endParaRPr lang="zh-TW" altLang="en-US"/>
           </a:p>
@@ -3180,11 +3180,7 @@
           <a:p>
             <a:r>
               <a:rPr lang="en-US" altLang="zh-TW" sz="3200" dirty="0" smtClean="0"/>
-              <a:t>SiTree </a:t>
-            </a:r>
-            <a:r>
-              <a:rPr lang="en-US" altLang="zh-TW" sz="3200" dirty="0" smtClean="0"/>
-              <a:t>Requirement</a:t>
+              <a:t>SiTree Requirement</a:t>
             </a:r>
             <a:endParaRPr lang="zh-TW" altLang="en-US" sz="3200" dirty="0"/>
           </a:p>
@@ -3202,8 +3198,8 @@
         </p:nvSpPr>
         <p:spPr>
           <a:xfrm>
-            <a:off x="251520" y="1340768"/>
-            <a:ext cx="7632848" cy="4785395"/>
+            <a:off x="-36512" y="1340768"/>
+            <a:ext cx="9108504" cy="4785395"/>
           </a:xfrm>
         </p:spPr>
         <p:txBody>
@@ -3282,11 +3278,26 @@
                   <a:srgbClr val="0070C0"/>
                 </a:solidFill>
               </a:rPr>
-              <a:t>crawl</a:t>
+              <a:t>retrieve</a:t>
             </a:r>
             <a:r>
               <a:rPr lang="en-US" altLang="zh-TW" sz="1400" dirty="0" smtClean="0"/>
-              <a:t> pages through </a:t>
+              <a:t> </a:t>
+            </a:r>
+            <a:r>
+              <a:rPr lang="en-US" altLang="zh-TW" sz="1400" dirty="0" smtClean="0">
+                <a:solidFill>
+                  <a:schemeClr val="tx1">
+                    <a:lumMod val="95000"/>
+                    <a:lumOff val="5000"/>
+                  </a:schemeClr>
+                </a:solidFill>
+              </a:rPr>
+              <a:t>crawling </a:t>
+            </a:r>
+            <a:r>
+              <a:rPr lang="en-US" altLang="zh-TW" sz="1400" dirty="0" smtClean="0"/>
+              <a:t>pages from </a:t>
             </a:r>
             <a:r>
               <a:rPr lang="en-US" altLang="zh-TW" sz="1400" b="1" dirty="0" smtClean="0"/>
@@ -3333,7 +3344,7 @@
             </a:r>
             <a:r>
               <a:rPr lang="en-US" altLang="zh-TW" sz="1400" dirty="0" smtClean="0"/>
-              <a:t> will </a:t>
+              <a:t> </a:t>
             </a:r>
             <a:r>
               <a:rPr lang="en-US" altLang="zh-TW" sz="1400" dirty="0" smtClean="0">
@@ -3341,7 +3352,7 @@
                   <a:srgbClr val="0070C0"/>
                 </a:solidFill>
               </a:rPr>
-              <a:t>notify</a:t>
+              <a:t>notifies</a:t>
             </a:r>
             <a:r>
               <a:rPr lang="en-US" altLang="zh-TW" sz="1400" dirty="0" smtClean="0"/>
@@ -3353,7 +3364,7 @@
             </a:r>
             <a:r>
               <a:rPr lang="en-US" altLang="zh-TW" sz="1400" dirty="0" smtClean="0"/>
-              <a:t> on each crawling and </a:t>
+              <a:t> on each crawling result and </a:t>
             </a:r>
             <a:r>
               <a:rPr lang="en-US" altLang="zh-TW" sz="1400" b="1" dirty="0" smtClean="0"/>
@@ -3361,8 +3372,92 @@
             </a:r>
             <a:r>
               <a:rPr lang="en-US" altLang="zh-TW" sz="1400" dirty="0" smtClean="0"/>
-              <a:t> can know the crawling result is success or fail.</a:t>
-            </a:r>
+              <a:t> can know the crawling result is success or fail</a:t>
+            </a:r>
+            <a:r>
+              <a:rPr lang="en-US" altLang="zh-TW" sz="1400" dirty="0" smtClean="0"/>
+              <a:t>.</a:t>
+            </a:r>
+          </a:p>
+          <a:p>
+            <a:pPr lvl="1"/>
+            <a:r>
+              <a:rPr lang="en-US" altLang="zh-TW" sz="1400" b="1" dirty="0" smtClean="0"/>
+              <a:t>CrawlController</a:t>
+            </a:r>
+            <a:r>
+              <a:rPr lang="en-US" altLang="zh-TW" sz="1400" dirty="0" smtClean="0"/>
+              <a:t> will update </a:t>
+            </a:r>
+            <a:r>
+              <a:rPr lang="en-US" altLang="zh-TW" sz="1400" b="1" dirty="0" smtClean="0"/>
+              <a:t>SiTree </a:t>
+            </a:r>
+            <a:r>
+              <a:rPr lang="en-US" altLang="zh-TW" sz="1400" dirty="0" smtClean="0"/>
+              <a:t>with </a:t>
+            </a:r>
+            <a:r>
+              <a:rPr lang="en-US" altLang="zh-TW" sz="1400" b="1" dirty="0" smtClean="0"/>
+              <a:t>Tuple</a:t>
+            </a:r>
+            <a:r>
+              <a:rPr lang="en-US" altLang="zh-TW" sz="1400" dirty="0" smtClean="0"/>
+              <a:t> information in real time. The </a:t>
+            </a:r>
+            <a:r>
+              <a:rPr lang="en-US" altLang="zh-TW" sz="1400" b="1" dirty="0" smtClean="0"/>
+              <a:t>SiTree</a:t>
+            </a:r>
+            <a:r>
+              <a:rPr lang="en-US" altLang="zh-TW" sz="1400" dirty="0" smtClean="0"/>
+              <a:t> can use first element of this </a:t>
+            </a:r>
+            <a:r>
+              <a:rPr lang="en-US" altLang="zh-TW" sz="1400" b="1" dirty="0" smtClean="0"/>
+              <a:t>Tuple</a:t>
+            </a:r>
+            <a:r>
+              <a:rPr lang="en-US" altLang="zh-TW" sz="1400" dirty="0" smtClean="0"/>
+              <a:t> to know whether the crawling of specific URL is success or not; second element of </a:t>
+            </a:r>
+            <a:r>
+              <a:rPr lang="en-US" altLang="zh-TW" sz="1400" b="1" dirty="0" smtClean="0"/>
+              <a:t>Tuple</a:t>
+            </a:r>
+            <a:r>
+              <a:rPr lang="en-US" altLang="zh-TW" sz="1400" dirty="0" smtClean="0"/>
+              <a:t> as crawling result.</a:t>
+            </a:r>
+            <a:endParaRPr lang="en-US" altLang="zh-TW" sz="1400" dirty="0" smtClean="0"/>
+          </a:p>
+          <a:p>
+            <a:pPr lvl="1"/>
+            <a:r>
+              <a:rPr lang="en-US" altLang="zh-TW" sz="1400" dirty="0" smtClean="0"/>
+              <a:t>More </a:t>
+            </a:r>
+            <a:r>
+              <a:rPr lang="en-US" altLang="zh-TW" sz="1400" dirty="0" smtClean="0"/>
+              <a:t>than one observers can be registered in </a:t>
+            </a:r>
+            <a:r>
+              <a:rPr lang="en-US" altLang="zh-TW" sz="1400" b="1" dirty="0"/>
+              <a:t>CrawlController</a:t>
+            </a:r>
+            <a:r>
+              <a:rPr lang="en-US" altLang="zh-TW" sz="1400" dirty="0" smtClean="0"/>
+              <a:t> by user and removed as </a:t>
+            </a:r>
+            <a:r>
+              <a:rPr lang="en-US" altLang="zh-TW" sz="1400" dirty="0" smtClean="0"/>
+              <a:t>required</a:t>
+            </a:r>
+            <a:r>
+              <a:rPr lang="en-US" altLang="zh-TW" sz="1400" dirty="0" smtClean="0"/>
+              <a:t>.</a:t>
+            </a:r>
+            <a:endParaRPr lang="en-US" altLang="zh-TW" sz="1400" dirty="0" smtClean="0"/>
           </a:p>
           <a:p>
             <a:r>
@@ -3399,8 +3494,12 @@
           <a:p>
             <a:pPr lvl="1"/>
             <a:r>
+              <a:rPr lang="en-US" altLang="zh-TW" sz="1400" b="1" dirty="0" smtClean="0"/>
+              <a:t>SiTree</a:t>
+            </a:r>
+            <a:r>
               <a:rPr lang="en-US" altLang="zh-TW" sz="1400" dirty="0" smtClean="0"/>
-              <a:t>Others</a:t>
+              <a:t> can output crawling result into file system.</a:t>
             </a:r>
             <a:endParaRPr lang="en-US" altLang="zh-TW" sz="1400" dirty="0"/>
           </a:p>
@@ -3465,11 +3564,7 @@
           <a:p>
             <a:r>
               <a:rPr lang="en-US" altLang="zh-TW" sz="3200" dirty="0" smtClean="0"/>
-              <a:t>SiTree </a:t>
-            </a:r>
-            <a:r>
-              <a:rPr lang="en-US" altLang="zh-TW" sz="3200" dirty="0" smtClean="0"/>
-              <a:t>Initial Design</a:t>
+              <a:t>SiTree Initial Design</a:t>
             </a:r>
             <a:endParaRPr lang="zh-TW" altLang="en-US" sz="3200" dirty="0"/>
           </a:p>
@@ -3727,14 +3822,14 @@
       </p:grpSp>
       <p:graphicFrame>
         <p:nvGraphicFramePr>
-          <p:cNvPr id="15" name="物件 14"/>
+          <p:cNvPr id="3" name="物件 2"/>
           <p:cNvGraphicFramePr>
             <a:graphicFrameLocks noChangeAspect="1"/>
           </p:cNvGraphicFramePr>
           <p:nvPr>
             <p:extLst>
               <p:ext uri="{D42A27DB-BD31-4B8C-83A1-F6EECF244321}">
-                <p14:modId xmlns:p14="http://schemas.microsoft.com/office/powerpoint/2010/main" val="1372282225"/>
+                <p14:modId xmlns:p14="http://schemas.microsoft.com/office/powerpoint/2010/main" val="3142461926"/>
               </p:ext>
             </p:extLst>
           </p:nvPr>
@@ -3747,7 +3842,7 @@
           <a:graphicData uri="http://schemas.openxmlformats.org/presentationml/2006/ole">
             <mc:AlternateContent xmlns:mc="http://schemas.openxmlformats.org/markup-compatibility/2006">
               <mc:Choice xmlns:v="urn:schemas-microsoft-com:vml" Requires="v">
-                <p:oleObj spid="_x0000_s1026" name="封裝程式殼層物件" showAsIcon="1" r:id="rId6" imgW="1676880" imgH="698760" progId="Package">
+                <p:oleObj spid="_x0000_s1034" name="封裝程式殼層物件" showAsIcon="1" r:id="rId6" imgW="1676880" imgH="698760" progId="Package">
                   <p:embed/>
                 </p:oleObj>
               </mc:Choice>

</xml_diff>

<commit_message>
- Enhance unit test cases - Update design document
</commit_message>
<xml_diff>
--- a/SD_Crawler4j/docs/Crawler4j_SiTreeDesign.pptx
+++ b/SD_Crawler4j/docs/Crawler4j_SiTreeDesign.pptx
@@ -12,7 +12,8 @@
     <p:sldId id="259" r:id="rId6"/>
     <p:sldId id="260" r:id="rId7"/>
     <p:sldId id="261" r:id="rId8"/>
-    <p:sldId id="258" r:id="rId9"/>
+    <p:sldId id="264" r:id="rId9"/>
+    <p:sldId id="258" r:id="rId10"/>
   </p:sldIdLst>
   <p:sldSz cx="9144000" cy="6858000" type="screen4x3"/>
   <p:notesSz cx="6858000" cy="9144000"/>
@@ -295,7 +296,7 @@
           <a:p>
             <a:fld id="{5BBEAD13-0566-4C6C-97E7-55F17F24B09F}" type="datetimeFigureOut">
               <a:rPr lang="zh-TW" altLang="en-US" smtClean="0"/>
-              <a:t>2014/6/7</a:t>
+              <a:t>2014/6/9</a:t>
             </a:fld>
             <a:endParaRPr lang="zh-TW" altLang="en-US"/>
           </a:p>
@@ -460,7 +461,7 @@
           <a:p>
             <a:fld id="{5BBEAD13-0566-4C6C-97E7-55F17F24B09F}" type="datetimeFigureOut">
               <a:rPr lang="zh-TW" altLang="en-US" smtClean="0"/>
-              <a:t>2014/6/7</a:t>
+              <a:t>2014/6/9</a:t>
             </a:fld>
             <a:endParaRPr lang="zh-TW" altLang="en-US"/>
           </a:p>
@@ -635,7 +636,7 @@
           <a:p>
             <a:fld id="{5BBEAD13-0566-4C6C-97E7-55F17F24B09F}" type="datetimeFigureOut">
               <a:rPr lang="zh-TW" altLang="en-US" smtClean="0"/>
-              <a:t>2014/6/7</a:t>
+              <a:t>2014/6/9</a:t>
             </a:fld>
             <a:endParaRPr lang="zh-TW" altLang="en-US"/>
           </a:p>
@@ -800,7 +801,7 @@
           <a:p>
             <a:fld id="{5BBEAD13-0566-4C6C-97E7-55F17F24B09F}" type="datetimeFigureOut">
               <a:rPr lang="zh-TW" altLang="en-US" smtClean="0"/>
-              <a:t>2014/6/7</a:t>
+              <a:t>2014/6/9</a:t>
             </a:fld>
             <a:endParaRPr lang="zh-TW" altLang="en-US"/>
           </a:p>
@@ -1041,7 +1042,7 @@
           <a:p>
             <a:fld id="{5BBEAD13-0566-4C6C-97E7-55F17F24B09F}" type="datetimeFigureOut">
               <a:rPr lang="zh-TW" altLang="en-US" smtClean="0"/>
-              <a:t>2014/6/7</a:t>
+              <a:t>2014/6/9</a:t>
             </a:fld>
             <a:endParaRPr lang="zh-TW" altLang="en-US"/>
           </a:p>
@@ -1324,7 +1325,7 @@
           <a:p>
             <a:fld id="{5BBEAD13-0566-4C6C-97E7-55F17F24B09F}" type="datetimeFigureOut">
               <a:rPr lang="zh-TW" altLang="en-US" smtClean="0"/>
-              <a:t>2014/6/7</a:t>
+              <a:t>2014/6/9</a:t>
             </a:fld>
             <a:endParaRPr lang="zh-TW" altLang="en-US"/>
           </a:p>
@@ -1741,7 +1742,7 @@
           <a:p>
             <a:fld id="{5BBEAD13-0566-4C6C-97E7-55F17F24B09F}" type="datetimeFigureOut">
               <a:rPr lang="zh-TW" altLang="en-US" smtClean="0"/>
-              <a:t>2014/6/7</a:t>
+              <a:t>2014/6/9</a:t>
             </a:fld>
             <a:endParaRPr lang="zh-TW" altLang="en-US"/>
           </a:p>
@@ -1854,7 +1855,7 @@
           <a:p>
             <a:fld id="{5BBEAD13-0566-4C6C-97E7-55F17F24B09F}" type="datetimeFigureOut">
               <a:rPr lang="zh-TW" altLang="en-US" smtClean="0"/>
-              <a:t>2014/6/7</a:t>
+              <a:t>2014/6/9</a:t>
             </a:fld>
             <a:endParaRPr lang="zh-TW" altLang="en-US"/>
           </a:p>
@@ -1944,7 +1945,7 @@
           <a:p>
             <a:fld id="{5BBEAD13-0566-4C6C-97E7-55F17F24B09F}" type="datetimeFigureOut">
               <a:rPr lang="zh-TW" altLang="en-US" smtClean="0"/>
-              <a:t>2014/6/7</a:t>
+              <a:t>2014/6/9</a:t>
             </a:fld>
             <a:endParaRPr lang="zh-TW" altLang="en-US"/>
           </a:p>
@@ -2216,7 +2217,7 @@
           <a:p>
             <a:fld id="{5BBEAD13-0566-4C6C-97E7-55F17F24B09F}" type="datetimeFigureOut">
               <a:rPr lang="zh-TW" altLang="en-US" smtClean="0"/>
-              <a:t>2014/6/7</a:t>
+              <a:t>2014/6/9</a:t>
             </a:fld>
             <a:endParaRPr lang="zh-TW" altLang="en-US"/>
           </a:p>
@@ -2464,7 +2465,7 @@
           <a:p>
             <a:fld id="{5BBEAD13-0566-4C6C-97E7-55F17F24B09F}" type="datetimeFigureOut">
               <a:rPr lang="zh-TW" altLang="en-US" smtClean="0"/>
-              <a:t>2014/6/7</a:t>
+              <a:t>2014/6/9</a:t>
             </a:fld>
             <a:endParaRPr lang="zh-TW" altLang="en-US"/>
           </a:p>
@@ -2672,7 +2673,7 @@
           <a:p>
             <a:fld id="{5BBEAD13-0566-4C6C-97E7-55F17F24B09F}" type="datetimeFigureOut">
               <a:rPr lang="zh-TW" altLang="en-US" smtClean="0"/>
-              <a:t>2014/6/7</a:t>
+              <a:t>2014/6/9</a:t>
             </a:fld>
             <a:endParaRPr lang="zh-TW" altLang="en-US"/>
           </a:p>
@@ -3059,9 +3060,20 @@
           <a:p>
             <a:r>
               <a:rPr lang="en-US" altLang="zh-TW" dirty="0" smtClean="0"/>
-              <a:t>SiTree Design</a:t>
-            </a:r>
-            <a:endParaRPr lang="zh-TW" altLang="en-US" dirty="0"/>
+              <a:t>Crawling Module</a:t>
+            </a:r>
+            <a:br>
+              <a:rPr lang="en-US" altLang="zh-TW" dirty="0" smtClean="0"/>
+            </a:br>
+            <a:r>
+              <a:rPr lang="en-US" altLang="zh-TW" sz="3200" dirty="0"/>
+              <a:t>(</a:t>
+            </a:r>
+            <a:r>
+              <a:rPr lang="en-US" altLang="zh-TW" sz="3200" dirty="0" smtClean="0"/>
+              <a:t>SiTree Design)</a:t>
+            </a:r>
+            <a:endParaRPr lang="zh-TW" altLang="en-US" sz="3200" dirty="0"/>
           </a:p>
         </p:txBody>
       </p:sp>
@@ -3824,7 +3836,7 @@
           <a:graphicData uri="http://schemas.openxmlformats.org/presentationml/2006/ole">
             <mc:AlternateContent xmlns:mc="http://schemas.openxmlformats.org/markup-compatibility/2006">
               <mc:Choice xmlns:v="urn:schemas-microsoft-com:vml" Requires="v">
-                <p:oleObj spid="_x0000_s1035" name="封裝程式殼層物件" showAsIcon="1" r:id="rId6" imgW="1676880" imgH="698760" progId="Package">
+                <p:oleObj spid="_x0000_s1068" name="封裝程式殼層物件" showAsIcon="1" r:id="rId6" imgW="1676880" imgH="698760" progId="Package">
                   <p:embed/>
                 </p:oleObj>
               </mc:Choice>
@@ -5650,7 +5662,11 @@
           <a:p>
             <a:r>
               <a:rPr lang="en-US" altLang="zh-TW" sz="3200" dirty="0" smtClean="0"/>
-              <a:t>Issue &amp; Enhancement</a:t>
+              <a:t>SiTree </a:t>
+            </a:r>
+            <a:r>
+              <a:rPr lang="en-US" altLang="zh-TW" sz="3200" dirty="0" smtClean="0"/>
+              <a:t>UnitTest</a:t>
             </a:r>
             <a:endParaRPr lang="zh-TW" altLang="en-US" sz="3200" dirty="0"/>
           </a:p>
@@ -5680,7 +5696,333 @@
           <a:p>
             <a:r>
               <a:rPr lang="en-US" altLang="zh-TW" sz="1800" dirty="0" smtClean="0"/>
-              <a:t>So far, the Crawler4j doesn’t support </a:t>
+              <a:t>I use JUnit 4.8 Eclipse plugin to do unit testing. For installation and evaluation, can refer to this “</a:t>
+            </a:r>
+            <a:r>
+              <a:rPr lang="en-US" altLang="zh-TW" sz="1800" b="1" dirty="0">
+                <a:hlinkClick r:id="rId3"/>
+              </a:rPr>
+              <a:t>JUnit - Plug with </a:t>
+            </a:r>
+            <a:r>
+              <a:rPr lang="en-US" altLang="zh-TW" sz="1800" b="1" dirty="0" smtClean="0">
+                <a:hlinkClick r:id="rId3"/>
+              </a:rPr>
+              <a:t>Eclipse</a:t>
+            </a:r>
+            <a:r>
+              <a:rPr lang="en-US" altLang="zh-TW" sz="1800" dirty="0" smtClean="0"/>
+              <a:t>”.</a:t>
+            </a:r>
+          </a:p>
+          <a:p>
+            <a:r>
+              <a:rPr lang="en-US" altLang="zh-TW" sz="1800" dirty="0" smtClean="0"/>
+              <a:t>In order to generate testing report, I install another Eclipse plugin “</a:t>
+            </a:r>
+            <a:r>
+              <a:rPr lang="en-US" altLang="zh-TW" sz="1800" b="1" dirty="0" smtClean="0">
+                <a:hlinkClick r:id="rId4"/>
+              </a:rPr>
+              <a:t>eCobertura</a:t>
+            </a:r>
+            <a:r>
+              <a:rPr lang="en-US" altLang="zh-TW" sz="1800" dirty="0" smtClean="0"/>
+              <a:t>” which can help me to calculate the coverage of lines/branches.</a:t>
+            </a:r>
+          </a:p>
+          <a:p>
+            <a:r>
+              <a:rPr lang="en-US" altLang="zh-TW" sz="1800" dirty="0" smtClean="0"/>
+              <a:t>So far, I open two kinds of testing cases:</a:t>
+            </a:r>
+          </a:p>
+          <a:p>
+            <a:pPr lvl="1"/>
+            <a:r>
+              <a:rPr lang="en-US" altLang="zh-TW" sz="1600" dirty="0" smtClean="0"/>
+              <a:t>FAST - </a:t>
+            </a:r>
+            <a:r>
+              <a:rPr lang="en-US" altLang="zh-TW" sz="1600" dirty="0"/>
+              <a:t> Functional Acceptance Simple </a:t>
+            </a:r>
+            <a:r>
+              <a:rPr lang="en-US" altLang="zh-TW" sz="1600" dirty="0" smtClean="0"/>
+              <a:t>Test (7)</a:t>
+            </a:r>
+          </a:p>
+          <a:p>
+            <a:pPr lvl="1"/>
+            <a:r>
+              <a:rPr lang="en-US" altLang="zh-TW" sz="1600" dirty="0" smtClean="0"/>
+              <a:t>FET – Force Error Test (1)</a:t>
+            </a:r>
+          </a:p>
+          <a:p>
+            <a:r>
+              <a:rPr lang="en-US" altLang="zh-TW" sz="1800" dirty="0" smtClean="0"/>
+              <a:t>The testing report:</a:t>
+            </a:r>
+          </a:p>
+          <a:p>
+            <a:endParaRPr lang="en-US" altLang="zh-TW" sz="1800" dirty="0"/>
+          </a:p>
+          <a:p>
+            <a:endParaRPr lang="en-US" altLang="zh-TW" sz="1800" dirty="0" smtClean="0"/>
+          </a:p>
+          <a:p>
+            <a:endParaRPr lang="en-US" altLang="zh-TW" sz="1800" dirty="0"/>
+          </a:p>
+          <a:p>
+            <a:endParaRPr lang="en-US" altLang="zh-TW" sz="1800" dirty="0" smtClean="0"/>
+          </a:p>
+          <a:p>
+            <a:r>
+              <a:rPr lang="en-US" altLang="zh-TW" sz="1800" dirty="0" smtClean="0"/>
+              <a:t>The part outside of coverage could  be:</a:t>
+            </a:r>
+          </a:p>
+          <a:p>
+            <a:pPr lvl="1"/>
+            <a:r>
+              <a:rPr lang="en-US" altLang="zh-TW" sz="1600" b="1" dirty="0" smtClean="0"/>
+              <a:t>Except catch: </a:t>
+            </a:r>
+            <a:r>
+              <a:rPr lang="en-US" altLang="zh-TW" sz="1600" dirty="0" smtClean="0"/>
+              <a:t>Such as network interruption/Open file fail. </a:t>
+            </a:r>
+          </a:p>
+          <a:p>
+            <a:pPr lvl="1"/>
+            <a:r>
+              <a:rPr lang="en-US" altLang="zh-TW" sz="1600" b="1" dirty="0"/>
+              <a:t>Error </a:t>
+            </a:r>
+            <a:r>
+              <a:rPr lang="en-US" altLang="zh-TW" sz="1600" b="1" dirty="0" smtClean="0"/>
+              <a:t>handling: </a:t>
+            </a:r>
+            <a:r>
+              <a:rPr lang="en-US" altLang="zh-TW" sz="1600" dirty="0" smtClean="0"/>
+              <a:t>Dead code maybe – Unreachable error handling.</a:t>
+            </a:r>
+          </a:p>
+          <a:p>
+            <a:endParaRPr lang="en-US" altLang="zh-TW" sz="1800" dirty="0"/>
+          </a:p>
+          <a:p>
+            <a:endParaRPr lang="en-US" altLang="zh-TW" sz="1800" dirty="0" smtClean="0"/>
+          </a:p>
+          <a:p>
+            <a:endParaRPr lang="en-US" altLang="zh-TW" sz="1800" dirty="0" smtClean="0"/>
+          </a:p>
+          <a:p>
+            <a:endParaRPr lang="en-US" altLang="zh-TW" sz="1800" dirty="0" smtClean="0"/>
+          </a:p>
+        </p:txBody>
+      </p:sp>
+      <p:pic>
+        <p:nvPicPr>
+          <p:cNvPr id="4" name="圖片 3"/>
+          <p:cNvPicPr>
+            <a:picLocks noChangeAspect="1"/>
+          </p:cNvPicPr>
+          <p:nvPr/>
+        </p:nvPicPr>
+        <p:blipFill>
+          <a:blip r:embed="rId5">
+            <a:extLst>
+              <a:ext uri="{28A0092B-C50C-407E-A947-70E740481C1C}">
+                <a14:useLocalDpi xmlns:a14="http://schemas.microsoft.com/office/drawing/2010/main" val="0"/>
+              </a:ext>
+            </a:extLst>
+          </a:blip>
+          <a:stretch>
+            <a:fillRect/>
+          </a:stretch>
+        </p:blipFill>
+        <p:spPr>
+          <a:xfrm>
+            <a:off x="-30882" y="3824308"/>
+            <a:ext cx="9144000" cy="1348424"/>
+          </a:xfrm>
+          <a:prstGeom prst="rect">
+            <a:avLst/>
+          </a:prstGeom>
+        </p:spPr>
+      </p:pic>
+      <p:graphicFrame>
+        <p:nvGraphicFramePr>
+          <p:cNvPr id="6" name="物件 5"/>
+          <p:cNvGraphicFramePr>
+            <a:graphicFrameLocks noChangeAspect="1"/>
+          </p:cNvGraphicFramePr>
+          <p:nvPr>
+            <p:extLst>
+              <p:ext uri="{D42A27DB-BD31-4B8C-83A1-F6EECF244321}">
+                <p14:modId xmlns:p14="http://schemas.microsoft.com/office/powerpoint/2010/main" val="2483139104"/>
+              </p:ext>
+            </p:extLst>
+          </p:nvPr>
+        </p:nvGraphicFramePr>
+        <p:xfrm>
+          <a:off x="7892008" y="2996952"/>
+          <a:ext cx="1219200" cy="698500"/>
+        </p:xfrm>
+        <a:graphic>
+          <a:graphicData uri="http://schemas.openxmlformats.org/presentationml/2006/ole">
+            <mc:AlternateContent xmlns:mc="http://schemas.openxmlformats.org/markup-compatibility/2006">
+              <mc:Choice xmlns:v="urn:schemas-microsoft-com:vml" Requires="v">
+                <p:oleObj spid="_x0000_s2064" name="封裝程式殼層物件" showAsIcon="1" r:id="rId6" imgW="1219320" imgH="698760" progId="Package">
+                  <p:embed/>
+                </p:oleObj>
+              </mc:Choice>
+              <mc:Fallback>
+                <p:oleObj name="封裝程式殼層物件" showAsIcon="1" r:id="rId6" imgW="1219320" imgH="698760" progId="Package">
+                  <p:embed/>
+                  <p:pic>
+                    <p:nvPicPr>
+                      <p:cNvPr id="0" name=""/>
+                      <p:cNvPicPr/>
+                      <p:nvPr/>
+                    </p:nvPicPr>
+                    <p:blipFill>
+                      <a:blip r:embed="rId7"/>
+                      <a:stretch>
+                        <a:fillRect/>
+                      </a:stretch>
+                    </p:blipFill>
+                    <p:spPr>
+                      <a:xfrm>
+                        <a:off x="7892008" y="2996952"/>
+                        <a:ext cx="1219200" cy="698500"/>
+                      </a:xfrm>
+                      <a:prstGeom prst="rect">
+                        <a:avLst/>
+                      </a:prstGeom>
+                    </p:spPr>
+                  </p:pic>
+                </p:oleObj>
+              </mc:Fallback>
+            </mc:AlternateContent>
+          </a:graphicData>
+        </a:graphic>
+      </p:graphicFrame>
+    </p:spTree>
+    <p:extLst>
+      <p:ext uri="{BB962C8B-B14F-4D97-AF65-F5344CB8AC3E}">
+        <p14:creationId xmlns:p14="http://schemas.microsoft.com/office/powerpoint/2010/main" val="3832159860"/>
+      </p:ext>
+    </p:extLst>
+  </p:cSld>
+  <p:clrMapOvr>
+    <a:masterClrMapping/>
+  </p:clrMapOvr>
+  <p:timing>
+    <p:tnLst>
+      <p:par>
+        <p:cTn id="1" dur="indefinite" restart="never" nodeType="tmRoot"/>
+      </p:par>
+    </p:tnLst>
+  </p:timing>
+</p:sld>
+</file>
+
+<file path=ppt/slides/slide9.xml><?xml version="1.0" encoding="utf-8"?>
+<p:sld xmlns:a="http://schemas.openxmlformats.org/drawingml/2006/main" xmlns:r="http://schemas.openxmlformats.org/officeDocument/2006/relationships" xmlns:p="http://schemas.openxmlformats.org/presentationml/2006/main">
+  <p:cSld>
+    <p:spTree>
+      <p:nvGrpSpPr>
+        <p:cNvPr id="1" name=""/>
+        <p:cNvGrpSpPr/>
+        <p:nvPr/>
+      </p:nvGrpSpPr>
+      <p:grpSpPr>
+        <a:xfrm>
+          <a:off x="0" y="0"/>
+          <a:ext cx="0" cy="0"/>
+          <a:chOff x="0" y="0"/>
+          <a:chExt cx="0" cy="0"/>
+        </a:xfrm>
+      </p:grpSpPr>
+      <p:sp>
+        <p:nvSpPr>
+          <p:cNvPr id="2" name="標題 1"/>
+          <p:cNvSpPr>
+            <a:spLocks noGrp="1"/>
+          </p:cNvSpPr>
+          <p:nvPr>
+            <p:ph type="title"/>
+          </p:nvPr>
+        </p:nvSpPr>
+        <p:spPr/>
+        <p:txBody>
+          <a:bodyPr>
+            <a:normAutofit/>
+          </a:bodyPr>
+          <a:lstStyle/>
+          <a:p>
+            <a:r>
+              <a:rPr lang="en-US" altLang="zh-TW" sz="3200" dirty="0" smtClean="0"/>
+              <a:t>Known Issue </a:t>
+            </a:r>
+            <a:r>
+              <a:rPr lang="en-US" altLang="zh-TW" sz="3200" dirty="0" smtClean="0"/>
+              <a:t>&amp; </a:t>
+            </a:r>
+            <a:r>
+              <a:rPr lang="en-US" altLang="zh-TW" sz="3200" dirty="0" smtClean="0"/>
+              <a:t>Enhancement plan</a:t>
+            </a:r>
+            <a:endParaRPr lang="zh-TW" altLang="en-US" sz="3200" dirty="0"/>
+          </a:p>
+        </p:txBody>
+      </p:sp>
+      <p:sp>
+        <p:nvSpPr>
+          <p:cNvPr id="3" name="內容版面配置區 2"/>
+          <p:cNvSpPr>
+            <a:spLocks noGrp="1"/>
+          </p:cNvSpPr>
+          <p:nvPr>
+            <p:ph idx="1"/>
+          </p:nvPr>
+        </p:nvSpPr>
+        <p:spPr>
+          <a:xfrm>
+            <a:off x="457200" y="1340768"/>
+            <a:ext cx="8229600" cy="4785395"/>
+          </a:xfrm>
+        </p:spPr>
+        <p:txBody>
+          <a:bodyPr>
+            <a:normAutofit/>
+          </a:bodyPr>
+          <a:lstStyle/>
+          <a:p>
+            <a:r>
+              <a:rPr lang="en-US" altLang="zh-TW" sz="1800" dirty="0"/>
+              <a:t>T</a:t>
+            </a:r>
+            <a:r>
+              <a:rPr lang="en-US" altLang="zh-TW" sz="1800" dirty="0" smtClean="0"/>
+              <a:t>he </a:t>
+            </a:r>
+            <a:r>
+              <a:rPr lang="en-US" altLang="zh-TW" sz="1800" b="1" i="1" dirty="0" smtClean="0">
+                <a:hlinkClick r:id="rId2"/>
+              </a:rPr>
+              <a:t>Crawler4j</a:t>
+            </a:r>
+            <a:r>
+              <a:rPr lang="en-US" altLang="zh-TW" sz="1800" b="1" i="1" dirty="0" smtClean="0"/>
+              <a:t> </a:t>
+            </a:r>
+            <a:r>
+              <a:rPr lang="en-US" altLang="zh-TW" sz="1800" dirty="0" smtClean="0"/>
+              <a:t>doesn’t support </a:t>
             </a:r>
             <a:r>
               <a:rPr lang="en-US" altLang="zh-TW" sz="1800" dirty="0"/>
@@ -5688,8 +6030,87 @@
             </a:r>
             <a:r>
               <a:rPr lang="en-US" altLang="zh-TW" sz="1800" dirty="0" smtClean="0"/>
-              <a:t>data…"&gt; tag</a:t>
-            </a:r>
+              <a:t>data…"&gt; </a:t>
+            </a:r>
+            <a:r>
+              <a:rPr lang="en-US" altLang="zh-TW" sz="1800" dirty="0" smtClean="0"/>
+              <a:t>tag</a:t>
+            </a:r>
+          </a:p>
+          <a:p>
+            <a:r>
+              <a:rPr lang="en-US" altLang="zh-TW" sz="1800" dirty="0"/>
+              <a:t>The </a:t>
+            </a:r>
+            <a:r>
+              <a:rPr lang="en-US" altLang="zh-TW" sz="1800" b="1" i="1" dirty="0">
+                <a:hlinkClick r:id="rId2"/>
+              </a:rPr>
+              <a:t>Crawler4j</a:t>
+            </a:r>
+            <a:r>
+              <a:rPr lang="en-US" altLang="zh-TW" sz="1800" b="1" i="1" dirty="0"/>
+              <a:t> </a:t>
+            </a:r>
+            <a:r>
+              <a:rPr lang="en-US" altLang="zh-TW" sz="1800" dirty="0" smtClean="0"/>
+              <a:t>doesn’t handle redirection perfectly.</a:t>
+            </a:r>
+          </a:p>
+          <a:p>
+            <a:r>
+              <a:rPr lang="en-US" altLang="zh-TW" sz="1800" dirty="0" smtClean="0"/>
+              <a:t>The performance of </a:t>
+            </a:r>
+            <a:r>
+              <a:rPr lang="en-US" altLang="zh-TW" sz="1800" b="1" i="1" dirty="0">
+                <a:hlinkClick r:id="rId2"/>
+              </a:rPr>
+              <a:t>Crawler4j </a:t>
+            </a:r>
+            <a:r>
+              <a:rPr lang="en-US" altLang="zh-TW" sz="1800" b="1" i="1" dirty="0" smtClean="0"/>
+              <a:t> </a:t>
+            </a:r>
+            <a:r>
+              <a:rPr lang="en-US" altLang="zh-TW" sz="1800" dirty="0"/>
+              <a:t>isn’t good and </a:t>
+            </a:r>
+            <a:r>
+              <a:rPr lang="en-US" altLang="zh-TW" sz="1800" dirty="0" smtClean="0"/>
+              <a:t>can be enhanced.</a:t>
+            </a:r>
+          </a:p>
+          <a:p>
+            <a:r>
+              <a:rPr lang="en-US" altLang="zh-TW" sz="1800" dirty="0" smtClean="0"/>
+              <a:t>More test cases can be added to ensure quality. (</a:t>
+            </a:r>
+            <a:r>
+              <a:rPr lang="en-US" altLang="zh-TW" sz="1400" dirty="0" smtClean="0"/>
+              <a:t>Ex. Volume Test/Stress Test</a:t>
+            </a:r>
+            <a:r>
+              <a:rPr lang="en-US" altLang="zh-TW" sz="1800" dirty="0" smtClean="0"/>
+              <a:t>)</a:t>
+            </a:r>
+          </a:p>
+          <a:p>
+            <a:r>
+              <a:rPr lang="en-US" altLang="zh-TW" sz="1800" dirty="0" smtClean="0"/>
+              <a:t>Well documentation. (</a:t>
+            </a:r>
+            <a:r>
+              <a:rPr lang="en-US" altLang="zh-TW" sz="1400" dirty="0" smtClean="0"/>
+              <a:t>Ex. FAQ, Readme</a:t>
+            </a:r>
+            <a:r>
+              <a:rPr lang="en-US" altLang="zh-TW" sz="1800" dirty="0" smtClean="0"/>
+              <a:t>)</a:t>
+            </a:r>
+          </a:p>
+          <a:p>
+            <a:endParaRPr lang="en-US" altLang="zh-TW" sz="1800" dirty="0" smtClean="0"/>
           </a:p>
           <a:p>
             <a:pPr marL="0" indent="0">

</xml_diff>

<commit_message>
- SiTreeDemo show URL ID
</commit_message>
<xml_diff>
--- a/SD_Crawler4j/docs/Crawler4j_SiTreeDesign.pptx
+++ b/SD_Crawler4j/docs/Crawler4j_SiTreeDesign.pptx
@@ -3043,6 +3043,36 @@
           <a:chExt cx="0" cy="0"/>
         </a:xfrm>
       </p:grpSpPr>
+      <p:pic>
+        <p:nvPicPr>
+          <p:cNvPr id="4" name="圖片 3"/>
+          <p:cNvPicPr>
+            <a:picLocks noChangeAspect="1"/>
+          </p:cNvPicPr>
+          <p:nvPr/>
+        </p:nvPicPr>
+        <p:blipFill>
+          <a:blip r:embed="rId2">
+            <a:extLst>
+              <a:ext uri="{28A0092B-C50C-407E-A947-70E740481C1C}">
+                <a14:useLocalDpi xmlns:a14="http://schemas.microsoft.com/office/drawing/2010/main" val="0"/>
+              </a:ext>
+            </a:extLst>
+          </a:blip>
+          <a:stretch>
+            <a:fillRect/>
+          </a:stretch>
+        </p:blipFill>
+        <p:spPr>
+          <a:xfrm>
+            <a:off x="1143844" y="2132856"/>
+            <a:ext cx="1629002" cy="1552792"/>
+          </a:xfrm>
+          <a:prstGeom prst="rect">
+            <a:avLst/>
+          </a:prstGeom>
+        </p:spPr>
+      </p:pic>
       <p:sp>
         <p:nvSpPr>
           <p:cNvPr id="2" name="標題 1"/>
@@ -3090,7 +3120,7 @@
         <p:spPr/>
         <p:txBody>
           <a:bodyPr>
-            <a:normAutofit/>
+            <a:normAutofit lnSpcReduction="10000"/>
           </a:bodyPr>
           <a:lstStyle/>
           <a:p>
@@ -3122,7 +3152,7 @@
               <a:rPr lang="zh-TW" altLang="en-US" sz="2400" dirty="0" smtClean="0"/>
               <a:t>使用</a:t>
             </a:r>
-            <a:endParaRPr lang="en-US" altLang="zh-TW" sz="2400" dirty="0"/>
+            <a:endParaRPr lang="en-US" altLang="zh-TW" sz="2400" dirty="0" smtClean="0"/>
           </a:p>
           <a:p>
             <a:pPr marL="457200" indent="-457200" algn="l">
@@ -3130,9 +3160,18 @@
             </a:pPr>
             <a:r>
               <a:rPr lang="en-US" altLang="zh-TW" sz="2400" dirty="0" smtClean="0"/>
-              <a:t>Crawl4j issue(s)</a:t>
-            </a:r>
-            <a:endParaRPr lang="zh-TW" altLang="en-US" sz="2400" dirty="0"/>
+              <a:t>Unit Test</a:t>
+            </a:r>
+            <a:endParaRPr lang="en-US" altLang="zh-TW" sz="2400" dirty="0"/>
+          </a:p>
+          <a:p>
+            <a:pPr marL="457200" indent="-457200" algn="l">
+              <a:buAutoNum type="arabicPeriod"/>
+            </a:pPr>
+            <a:r>
+              <a:rPr lang="en-US" altLang="zh-TW" sz="2400" dirty="0" smtClean="0"/>
+              <a:t>Known Issues &amp; Enhancement plan</a:t>
+            </a:r>
           </a:p>
         </p:txBody>
       </p:sp>
@@ -3191,7 +3230,9 @@
           <a:lstStyle/>
           <a:p>
             <a:r>
-              <a:rPr lang="en-US" altLang="zh-TW" sz="3200" dirty="0" smtClean="0"/>
+              <a:rPr lang="en-US" altLang="zh-TW" sz="3200" dirty="0" smtClean="0">
+                <a:hlinkClick r:id="rId2"/>
+              </a:rPr>
               <a:t>SiTree Requirement</a:t>
             </a:r>
             <a:endParaRPr lang="zh-TW" altLang="en-US" sz="3200" dirty="0"/>
@@ -3836,7 +3877,7 @@
           <a:graphicData uri="http://schemas.openxmlformats.org/presentationml/2006/ole">
             <mc:AlternateContent xmlns:mc="http://schemas.openxmlformats.org/markup-compatibility/2006">
               <mc:Choice xmlns:v="urn:schemas-microsoft-com:vml" Requires="v">
-                <p:oleObj spid="_x0000_s1068" name="封裝程式殼層物件" showAsIcon="1" r:id="rId6" imgW="1676880" imgH="698760" progId="Package">
+                <p:oleObj spid="_x0000_s1073" name="封裝程式殼層物件" showAsIcon="1" r:id="rId6" imgW="1676880" imgH="698760" progId="Package">
                   <p:embed/>
                 </p:oleObj>
               </mc:Choice>
@@ -5662,11 +5703,7 @@
           <a:p>
             <a:r>
               <a:rPr lang="en-US" altLang="zh-TW" sz="3200" dirty="0" smtClean="0"/>
-              <a:t>SiTree </a:t>
-            </a:r>
-            <a:r>
-              <a:rPr lang="en-US" altLang="zh-TW" sz="3200" dirty="0" smtClean="0"/>
-              <a:t>UnitTest</a:t>
+              <a:t>SiTree UnitTest</a:t>
             </a:r>
             <a:endParaRPr lang="zh-TW" altLang="en-US" sz="3200" dirty="0"/>
           </a:p>
@@ -5875,7 +5912,7 @@
           <a:graphicData uri="http://schemas.openxmlformats.org/presentationml/2006/ole">
             <mc:AlternateContent xmlns:mc="http://schemas.openxmlformats.org/markup-compatibility/2006">
               <mc:Choice xmlns:v="urn:schemas-microsoft-com:vml" Requires="v">
-                <p:oleObj spid="_x0000_s2064" name="封裝程式殼層物件" showAsIcon="1" r:id="rId6" imgW="1219320" imgH="698760" progId="Package">
+                <p:oleObj spid="_x0000_s2069" name="封裝程式殼層物件" showAsIcon="1" r:id="rId6" imgW="1219320" imgH="698760" progId="Package">
                   <p:embed/>
                 </p:oleObj>
               </mc:Choice>
@@ -5966,15 +6003,7 @@
           <a:p>
             <a:r>
               <a:rPr lang="en-US" altLang="zh-TW" sz="3200" dirty="0" smtClean="0"/>
-              <a:t>Known Issue </a:t>
-            </a:r>
-            <a:r>
-              <a:rPr lang="en-US" altLang="zh-TW" sz="3200" dirty="0" smtClean="0"/>
-              <a:t>&amp; </a:t>
-            </a:r>
-            <a:r>
-              <a:rPr lang="en-US" altLang="zh-TW" sz="3200" dirty="0" smtClean="0"/>
-              <a:t>Enhancement plan</a:t>
+              <a:t>Known Issue &amp; Enhancement plan</a:t>
             </a:r>
             <a:endParaRPr lang="zh-TW" altLang="en-US" sz="3200" dirty="0"/>
           </a:p>
@@ -6030,11 +6059,7 @@
             </a:r>
             <a:r>
               <a:rPr lang="en-US" altLang="zh-TW" sz="1800" dirty="0" smtClean="0"/>
-              <a:t>data…"&gt; </a:t>
-            </a:r>
-            <a:r>
-              <a:rPr lang="en-US" altLang="zh-TW" sz="1800" dirty="0" smtClean="0"/>
-              <a:t>tag</a:t>
+              <a:t>data…"&gt; tag</a:t>
             </a:r>
           </a:p>
           <a:p>

</xml_diff>